<commit_message>
Lau - presentación resumida
</commit_message>
<xml_diff>
--- a/Docs/01-Relevamiento Inicial/Presentacion/PrimeraExposicion - Resumida.pptx
+++ b/Docs/01-Relevamiento Inicial/Presentacion/PrimeraExposicion - Resumida.pptx
@@ -5,10 +5,10 @@
     <p:sldMasterId id="2147483648" r:id="rId1"/>
   </p:sldMasterIdLst>
   <p:notesMasterIdLst>
-    <p:notesMasterId r:id="rId21"/>
+    <p:notesMasterId r:id="rId26"/>
   </p:notesMasterIdLst>
   <p:handoutMasterIdLst>
-    <p:handoutMasterId r:id="rId22"/>
+    <p:handoutMasterId r:id="rId27"/>
   </p:handoutMasterIdLst>
   <p:sldIdLst>
     <p:sldId id="259" r:id="rId2"/>
@@ -21,15 +21,20 @@
     <p:sldId id="282" r:id="rId9"/>
     <p:sldId id="283" r:id="rId10"/>
     <p:sldId id="292" r:id="rId11"/>
-    <p:sldId id="284" r:id="rId12"/>
-    <p:sldId id="293" r:id="rId13"/>
-    <p:sldId id="294" r:id="rId14"/>
-    <p:sldId id="306" r:id="rId15"/>
-    <p:sldId id="262" r:id="rId16"/>
-    <p:sldId id="304" r:id="rId17"/>
-    <p:sldId id="305" r:id="rId18"/>
-    <p:sldId id="277" r:id="rId19"/>
-    <p:sldId id="278" r:id="rId20"/>
+    <p:sldId id="308" r:id="rId12"/>
+    <p:sldId id="307" r:id="rId13"/>
+    <p:sldId id="309" r:id="rId14"/>
+    <p:sldId id="310" r:id="rId15"/>
+    <p:sldId id="311" r:id="rId16"/>
+    <p:sldId id="284" r:id="rId17"/>
+    <p:sldId id="293" r:id="rId18"/>
+    <p:sldId id="294" r:id="rId19"/>
+    <p:sldId id="306" r:id="rId20"/>
+    <p:sldId id="262" r:id="rId21"/>
+    <p:sldId id="304" r:id="rId22"/>
+    <p:sldId id="305" r:id="rId23"/>
+    <p:sldId id="277" r:id="rId24"/>
+    <p:sldId id="278" r:id="rId25"/>
   </p:sldIdLst>
   <p:sldSz cx="9144000" cy="6858000" type="screen4x3"/>
   <p:notesSz cx="6858000" cy="9144000"/>
@@ -147,6 +152,11 @@
             <p14:sldId id="282"/>
             <p14:sldId id="283"/>
             <p14:sldId id="292"/>
+            <p14:sldId id="308"/>
+            <p14:sldId id="307"/>
+            <p14:sldId id="309"/>
+            <p14:sldId id="310"/>
+            <p14:sldId id="311"/>
             <p14:sldId id="284"/>
             <p14:sldId id="293"/>
             <p14:sldId id="294"/>
@@ -4567,7 +4577,304 @@
       </p:grpSpPr>
       <p:sp>
         <p:nvSpPr>
-          <p:cNvPr id="43010" name="Rectangle 23"/>
+          <p:cNvPr id="2" name="1 Marcador de imagen de diapositiva"/>
+          <p:cNvSpPr>
+            <a:spLocks noGrp="1" noRot="1" noChangeAspect="1"/>
+          </p:cNvSpPr>
+          <p:nvPr>
+            <p:ph type="sldImg"/>
+          </p:nvPr>
+        </p:nvSpPr>
+        <p:spPr/>
+      </p:sp>
+      <p:sp>
+        <p:nvSpPr>
+          <p:cNvPr id="3" name="2 Marcador de notas"/>
+          <p:cNvSpPr>
+            <a:spLocks noGrp="1"/>
+          </p:cNvSpPr>
+          <p:nvPr>
+            <p:ph type="body" idx="1"/>
+          </p:nvPr>
+        </p:nvSpPr>
+        <p:spPr/>
+        <p:txBody>
+          <a:bodyPr/>
+          <a:lstStyle/>
+          <a:p>
+            <a:r>
+              <a:rPr lang="es-AR" dirty="0" smtClean="0"/>
+              <a:t>¿Cuál es la probabilidad de que el nuevo sistema se use como se supone?</a:t>
+            </a:r>
+          </a:p>
+          <a:p>
+            <a:r>
+              <a:rPr lang="es-AR" dirty="0" smtClean="0"/>
+              <a:t>La capacitación de los usuarios</a:t>
+            </a:r>
+          </a:p>
+          <a:p>
+            <a:r>
+              <a:rPr lang="es-AR" dirty="0" smtClean="0"/>
+              <a:t>Usuario familiarizado con el uso de una pc y un navegador web</a:t>
+            </a:r>
+          </a:p>
+          <a:p>
+            <a:r>
+              <a:rPr lang="es-AR" dirty="0" smtClean="0"/>
+              <a:t>Los distintos módulos que componen el sistema serán instalados paulatinamente, a medida que se capacita al personal</a:t>
+            </a:r>
+          </a:p>
+          <a:p>
+            <a:r>
+              <a:rPr lang="es-AR" dirty="0" smtClean="0"/>
+              <a:t>El sistema será desarrollado con las últimas herramientas disponibles en el mercado, lo cual permite que se obtenga un producto moderno y de lenta obsolescencia</a:t>
+            </a:r>
+          </a:p>
+          <a:p>
+            <a:endParaRPr lang="es-AR" dirty="0" smtClean="0"/>
+          </a:p>
+          <a:p>
+            <a:r>
+              <a:rPr lang="es-AR" dirty="0" smtClean="0"/>
+              <a:t>Concluimos que el desarrollo del proyecto es factible desde un punto de vista operativo, dando mayor protagonismo a los beneficiarios del sistema, redistribuyendo tareas e información acorde al rol de cada uno</a:t>
+            </a:r>
+            <a:endParaRPr lang="es-AR" dirty="0"/>
+          </a:p>
+        </p:txBody>
+      </p:sp>
+      <p:sp>
+        <p:nvSpPr>
+          <p:cNvPr id="4" name="3 Marcador de número de diapositiva"/>
+          <p:cNvSpPr>
+            <a:spLocks noGrp="1"/>
+          </p:cNvSpPr>
+          <p:nvPr>
+            <p:ph type="sldNum" sz="quarter" idx="10"/>
+          </p:nvPr>
+        </p:nvSpPr>
+        <p:spPr/>
+        <p:txBody>
+          <a:bodyPr/>
+          <a:lstStyle/>
+          <a:p>
+            <a:fld id="{75693FD4-8F83-4EF7-AC3F-0DC0388986B0}" type="slidenum">
+              <a:rPr lang="es-AR" smtClean="0"/>
+              <a:pPr/>
+              <a:t>15</a:t>
+            </a:fld>
+            <a:endParaRPr lang="es-AR"/>
+          </a:p>
+        </p:txBody>
+      </p:sp>
+    </p:spTree>
+    <p:extLst>
+      <p:ext uri="{BB962C8B-B14F-4D97-AF65-F5344CB8AC3E}">
+        <p14:creationId xmlns:p14="http://schemas.microsoft.com/office/powerpoint/2010/main" val="14713586"/>
+      </p:ext>
+    </p:extLst>
+  </p:cSld>
+  <p:clrMapOvr>
+    <a:masterClrMapping/>
+  </p:clrMapOvr>
+</p:notes>
+</file>
+
+<file path=ppt/notesSlides/notesSlide11.xml><?xml version="1.0" encoding="utf-8"?>
+<p:notes xmlns:a="http://schemas.openxmlformats.org/drawingml/2006/main" xmlns:r="http://schemas.openxmlformats.org/officeDocument/2006/relationships" xmlns:p="http://schemas.openxmlformats.org/presentationml/2006/main">
+  <p:cSld>
+    <p:spTree>
+      <p:nvGrpSpPr>
+        <p:cNvPr id="1" name=""/>
+        <p:cNvGrpSpPr/>
+        <p:nvPr/>
+      </p:nvGrpSpPr>
+      <p:grpSpPr>
+        <a:xfrm>
+          <a:off x="0" y="0"/>
+          <a:ext cx="0" cy="0"/>
+          <a:chOff x="0" y="0"/>
+          <a:chExt cx="0" cy="0"/>
+        </a:xfrm>
+      </p:grpSpPr>
+      <p:sp>
+        <p:nvSpPr>
+          <p:cNvPr id="2" name="Slide Image Placeholder 1"/>
+          <p:cNvSpPr>
+            <a:spLocks noGrp="1" noRot="1" noChangeAspect="1"/>
+          </p:cNvSpPr>
+          <p:nvPr>
+            <p:ph type="sldImg"/>
+          </p:nvPr>
+        </p:nvSpPr>
+        <p:spPr/>
+      </p:sp>
+      <p:sp>
+        <p:nvSpPr>
+          <p:cNvPr id="3" name="Notes Placeholder 2"/>
+          <p:cNvSpPr>
+            <a:spLocks noGrp="1"/>
+          </p:cNvSpPr>
+          <p:nvPr>
+            <p:ph type="body" idx="1"/>
+          </p:nvPr>
+        </p:nvSpPr>
+        <p:spPr/>
+        <p:txBody>
+          <a:bodyPr/>
+          <a:lstStyle/>
+          <a:p>
+            <a:endParaRPr lang="es-ES"/>
+          </a:p>
+        </p:txBody>
+      </p:sp>
+      <p:sp>
+        <p:nvSpPr>
+          <p:cNvPr id="4" name="Slide Number Placeholder 3"/>
+          <p:cNvSpPr>
+            <a:spLocks noGrp="1"/>
+          </p:cNvSpPr>
+          <p:nvPr>
+            <p:ph type="sldNum" sz="quarter" idx="10"/>
+          </p:nvPr>
+        </p:nvSpPr>
+        <p:spPr/>
+        <p:txBody>
+          <a:bodyPr/>
+          <a:lstStyle/>
+          <a:p>
+            <a:fld id="{75693FD4-8F83-4EF7-AC3F-0DC0388986B0}" type="slidenum">
+              <a:rPr lang="es-ES" smtClean="0"/>
+              <a:pPr/>
+              <a:t>16</a:t>
+            </a:fld>
+            <a:endParaRPr lang="es-ES"/>
+          </a:p>
+        </p:txBody>
+      </p:sp>
+    </p:spTree>
+  </p:cSld>
+  <p:clrMapOvr>
+    <a:masterClrMapping/>
+  </p:clrMapOvr>
+</p:notes>
+</file>
+
+<file path=ppt/notesSlides/notesSlide12.xml><?xml version="1.0" encoding="utf-8"?>
+<p:notes xmlns:a="http://schemas.openxmlformats.org/drawingml/2006/main" xmlns:r="http://schemas.openxmlformats.org/officeDocument/2006/relationships" xmlns:p="http://schemas.openxmlformats.org/presentationml/2006/main">
+  <p:cSld>
+    <p:spTree>
+      <p:nvGrpSpPr>
+        <p:cNvPr id="1" name=""/>
+        <p:cNvGrpSpPr/>
+        <p:nvPr/>
+      </p:nvGrpSpPr>
+      <p:grpSpPr>
+        <a:xfrm>
+          <a:off x="0" y="0"/>
+          <a:ext cx="0" cy="0"/>
+          <a:chOff x="0" y="0"/>
+          <a:chExt cx="0" cy="0"/>
+        </a:xfrm>
+      </p:grpSpPr>
+      <p:sp>
+        <p:nvSpPr>
+          <p:cNvPr id="3" name="Notes Placeholder 2"/>
+          <p:cNvSpPr>
+            <a:spLocks noGrp="1"/>
+          </p:cNvSpPr>
+          <p:nvPr>
+            <p:ph type="body" idx="1"/>
+          </p:nvPr>
+        </p:nvSpPr>
+        <p:spPr/>
+        <p:txBody>
+          <a:bodyPr numCol="2" spcCol="182880">
+            <a:noAutofit/>
+          </a:bodyPr>
+          <a:lstStyle/>
+          <a:p>
+            <a:pPr marL="228600" marR="0" indent="-228600" algn="l" defTabSz="914400" rtl="0" eaLnBrk="1" fontAlgn="auto" latinLnBrk="0" hangingPunct="1">
+              <a:lnSpc>
+                <a:spcPct val="100000"/>
+              </a:lnSpc>
+              <a:spcBef>
+                <a:spcPts val="0"/>
+              </a:spcBef>
+              <a:spcAft>
+                <a:spcPts val="0"/>
+              </a:spcAft>
+              <a:buClrTx/>
+              <a:buSzTx/>
+              <a:buFont typeface="+mj-lt"/>
+              <a:buNone/>
+              <a:tabLst/>
+              <a:defRPr lang="es-ES"/>
+            </a:pPr>
+            <a:r>
+              <a:rPr lang="es-ES" sz="1200" dirty="0" smtClean="0"/>
+              <a:t>Ésta es otra opción</a:t>
+            </a:r>
+            <a:r>
+              <a:rPr lang="es-ES" sz="1200" baseline="0" dirty="0" smtClean="0"/>
+              <a:t> para una diapositiva Información general.</a:t>
+            </a:r>
+            <a:endParaRPr lang="es-ES" sz="1200" dirty="0" smtClean="0"/>
+          </a:p>
+          <a:p>
+            <a:pPr marL="228600" indent="-228600">
+              <a:buFont typeface="+mj-lt"/>
+              <a:buNone/>
+            </a:pPr>
+            <a:endParaRPr lang="es-ES" sz="1200" dirty="0"/>
+          </a:p>
+        </p:txBody>
+      </p:sp>
+      <p:sp>
+        <p:nvSpPr>
+          <p:cNvPr id="5" name="Slide Image Placeholder 4"/>
+          <p:cNvSpPr>
+            <a:spLocks noGrp="1" noRot="1" noChangeAspect="1"/>
+          </p:cNvSpPr>
+          <p:nvPr>
+            <p:ph type="sldImg"/>
+          </p:nvPr>
+        </p:nvSpPr>
+        <p:spPr>
+          <a:xfrm>
+            <a:off x="539750" y="503238"/>
+            <a:ext cx="3143250" cy="2359025"/>
+          </a:xfrm>
+        </p:spPr>
+      </p:sp>
+    </p:spTree>
+  </p:cSld>
+  <p:clrMapOvr>
+    <a:masterClrMapping/>
+  </p:clrMapOvr>
+</p:notes>
+</file>
+
+<file path=ppt/notesSlides/notesSlide13.xml><?xml version="1.0" encoding="utf-8"?>
+<p:notes xmlns:a="http://schemas.openxmlformats.org/drawingml/2006/main" xmlns:r="http://schemas.openxmlformats.org/officeDocument/2006/relationships" xmlns:p="http://schemas.openxmlformats.org/presentationml/2006/main">
+  <p:cSld>
+    <p:spTree>
+      <p:nvGrpSpPr>
+        <p:cNvPr id="1" name=""/>
+        <p:cNvGrpSpPr/>
+        <p:nvPr/>
+      </p:nvGrpSpPr>
+      <p:grpSpPr>
+        <a:xfrm>
+          <a:off x="0" y="0"/>
+          <a:ext cx="0" cy="0"/>
+          <a:chOff x="0" y="0"/>
+          <a:chExt cx="0" cy="0"/>
+        </a:xfrm>
+      </p:grpSpPr>
+      <p:sp>
+        <p:nvSpPr>
+          <p:cNvPr id="41986" name="Rectangle 23"/>
           <p:cNvSpPr>
             <a:spLocks noGrp="1" noChangeArrowheads="1"/>
           </p:cNvSpPr>
@@ -4596,7 +4903,7 @@
       </p:sp>
       <p:sp>
         <p:nvSpPr>
-          <p:cNvPr id="43011" name="Rectangle 25"/>
+          <p:cNvPr id="41987" name="Rectangle 25"/>
           <p:cNvSpPr>
             <a:spLocks noGrp="1" noChangeArrowheads="1"/>
           </p:cNvSpPr>
@@ -4620,7 +4927,7 @@
       </p:sp>
       <p:sp>
         <p:nvSpPr>
-          <p:cNvPr id="43012" name="Rectangle 26"/>
+          <p:cNvPr id="41988" name="Rectangle 26"/>
           <p:cNvSpPr>
             <a:spLocks noGrp="1" noChangeArrowheads="1"/>
           </p:cNvSpPr>
@@ -4635,10 +4942,162 @@
           <a:bodyPr/>
           <a:lstStyle/>
           <a:p>
+            <a:fld id="{B2B44A5F-6CE4-493C-A0D7-6834FF76660C}" type="slidenum">
+              <a:rPr lang="es-ES" smtClean="0"/>
+              <a:pPr/>
+              <a:t>23</a:t>
+            </a:fld>
+            <a:endParaRPr lang="es-ES" dirty="0" smtClean="0"/>
+          </a:p>
+        </p:txBody>
+      </p:sp>
+      <p:sp>
+        <p:nvSpPr>
+          <p:cNvPr id="41989" name="Rectangle 2"/>
+          <p:cNvSpPr>
+            <a:spLocks noGrp="1" noRot="1" noChangeAspect="1" noChangeArrowheads="1" noTextEdit="1"/>
+          </p:cNvSpPr>
+          <p:nvPr>
+            <p:ph type="sldImg"/>
+          </p:nvPr>
+        </p:nvSpPr>
+        <p:spPr>
+          <a:xfrm>
+            <a:off x="1143000" y="450850"/>
+            <a:ext cx="4572000" cy="3429000"/>
+          </a:xfrm>
+          <a:ln/>
+        </p:spPr>
+      </p:sp>
+      <p:sp>
+        <p:nvSpPr>
+          <p:cNvPr id="41990" name="Rectangle 3"/>
+          <p:cNvSpPr>
+            <a:spLocks noGrp="1" noChangeArrowheads="1"/>
+          </p:cNvSpPr>
+          <p:nvPr>
+            <p:ph type="body" idx="1"/>
+          </p:nvPr>
+        </p:nvSpPr>
+        <p:spPr>
+          <a:xfrm>
+            <a:off x="307492" y="4130104"/>
+            <a:ext cx="6261652" cy="4554823"/>
+          </a:xfrm>
+          <a:noFill/>
+          <a:ln/>
+        </p:spPr>
+        <p:txBody>
+          <a:bodyPr/>
+          <a:lstStyle/>
+          <a:p>
+            <a:pPr>
+              <a:buFontTx/>
+              <a:buNone/>
+            </a:pPr>
+            <a:endParaRPr lang="es-ES" dirty="0" smtClean="0"/>
+          </a:p>
+        </p:txBody>
+      </p:sp>
+    </p:spTree>
+  </p:cSld>
+  <p:clrMapOvr>
+    <a:masterClrMapping/>
+  </p:clrMapOvr>
+</p:notes>
+</file>
+
+<file path=ppt/notesSlides/notesSlide14.xml><?xml version="1.0" encoding="utf-8"?>
+<p:notes xmlns:a="http://schemas.openxmlformats.org/drawingml/2006/main" xmlns:r="http://schemas.openxmlformats.org/officeDocument/2006/relationships" xmlns:p="http://schemas.openxmlformats.org/presentationml/2006/main">
+  <p:cSld>
+    <p:spTree>
+      <p:nvGrpSpPr>
+        <p:cNvPr id="1" name=""/>
+        <p:cNvGrpSpPr/>
+        <p:nvPr/>
+      </p:nvGrpSpPr>
+      <p:grpSpPr>
+        <a:xfrm>
+          <a:off x="0" y="0"/>
+          <a:ext cx="0" cy="0"/>
+          <a:chOff x="0" y="0"/>
+          <a:chExt cx="0" cy="0"/>
+        </a:xfrm>
+      </p:grpSpPr>
+      <p:sp>
+        <p:nvSpPr>
+          <p:cNvPr id="43010" name="Rectangle 23"/>
+          <p:cNvSpPr>
+            <a:spLocks noGrp="1" noChangeArrowheads="1"/>
+          </p:cNvSpPr>
+          <p:nvPr>
+            <p:ph type="hdr" sz="quarter"/>
+          </p:nvPr>
+        </p:nvSpPr>
+        <p:spPr>
+          <a:noFill/>
+        </p:spPr>
+        <p:txBody>
+          <a:bodyPr/>
+          <a:lstStyle/>
+          <a:p>
+            <a:r>
+              <a:rPr lang="es-ES" dirty="0" smtClean="0"/>
+              <a:t>Microsoft </a:t>
+            </a:r>
+            <a:r>
+              <a:rPr lang="es-ES" b="1" dirty="0" smtClean="0"/>
+              <a:t>Excelencia en ingeniería</a:t>
+            </a:r>
+            <a:endParaRPr lang="es-ES" dirty="0" smtClean="0"/>
+          </a:p>
+        </p:txBody>
+      </p:sp>
+      <p:sp>
+        <p:nvSpPr>
+          <p:cNvPr id="43011" name="Rectangle 25"/>
+          <p:cNvSpPr>
+            <a:spLocks noGrp="1" noChangeArrowheads="1"/>
+          </p:cNvSpPr>
+          <p:nvPr>
+            <p:ph type="ftr" sz="quarter" idx="4"/>
+          </p:nvPr>
+        </p:nvSpPr>
+        <p:spPr>
+          <a:noFill/>
+        </p:spPr>
+        <p:txBody>
+          <a:bodyPr/>
+          <a:lstStyle/>
+          <a:p>
+            <a:r>
+              <a:rPr lang="es-ES" dirty="0" smtClean="0"/>
+              <a:t>Información confidencial de Microsoft</a:t>
+            </a:r>
+          </a:p>
+        </p:txBody>
+      </p:sp>
+      <p:sp>
+        <p:nvSpPr>
+          <p:cNvPr id="43012" name="Rectangle 26"/>
+          <p:cNvSpPr>
+            <a:spLocks noGrp="1" noChangeArrowheads="1"/>
+          </p:cNvSpPr>
+          <p:nvPr>
+            <p:ph type="sldNum" sz="quarter" idx="5"/>
+          </p:nvPr>
+        </p:nvSpPr>
+        <p:spPr>
+          <a:noFill/>
+        </p:spPr>
+        <p:txBody>
+          <a:bodyPr/>
+          <a:lstStyle/>
+          <a:p>
             <a:fld id="{B5FF76F4-FC11-42FE-9D94-04E3E6D16C06}" type="slidenum">
               <a:rPr lang="es-ES" smtClean="0"/>
               <a:pPr/>
-              <a:t>19</a:t>
+              <a:t>24</a:t>
             </a:fld>
             <a:endParaRPr lang="es-ES" dirty="0" smtClean="0"/>
           </a:p>
@@ -5334,7 +5793,19 @@
       </p:grpSpPr>
       <p:sp>
         <p:nvSpPr>
-          <p:cNvPr id="3" name="Notes Placeholder 2"/>
+          <p:cNvPr id="2" name="1 Marcador de imagen de diapositiva"/>
+          <p:cNvSpPr>
+            <a:spLocks noGrp="1" noRot="1" noChangeAspect="1"/>
+          </p:cNvSpPr>
+          <p:nvPr>
+            <p:ph type="sldImg"/>
+          </p:nvPr>
+        </p:nvSpPr>
+        <p:spPr/>
+      </p:sp>
+      <p:sp>
+        <p:nvSpPr>
+          <p:cNvPr id="3" name="2 Marcador de notas"/>
           <p:cNvSpPr>
             <a:spLocks noGrp="1"/>
           </p:cNvSpPr>
@@ -5344,12 +5815,10 @@
         </p:nvSpPr>
         <p:spPr/>
         <p:txBody>
-          <a:bodyPr numCol="2" spcCol="182880">
-            <a:noAutofit/>
-          </a:bodyPr>
+          <a:bodyPr/>
           <a:lstStyle/>
           <a:p>
-            <a:pPr marL="228600" marR="0" indent="-228600" algn="l" defTabSz="914400" rtl="0" eaLnBrk="1" fontAlgn="auto" latinLnBrk="0" hangingPunct="1">
+            <a:pPr marL="0" marR="0" indent="0" algn="l" defTabSz="914400" rtl="0" eaLnBrk="1" fontAlgn="auto" latinLnBrk="0" hangingPunct="1">
               <a:lnSpc>
                 <a:spcPct val="100000"/>
               </a:lnSpc>
@@ -5361,48 +5830,303 @@
               </a:spcAft>
               <a:buClrTx/>
               <a:buSzTx/>
-              <a:buFont typeface="+mj-lt"/>
+              <a:buFontTx/>
               <a:buNone/>
               <a:tabLst/>
-              <a:defRPr lang="es-ES"/>
+              <a:defRPr/>
             </a:pPr>
             <a:r>
-              <a:rPr lang="es-ES" sz="1200" dirty="0" smtClean="0"/>
-              <a:t>Ésta es otra opción</a:t>
-            </a:r>
-            <a:r>
-              <a:rPr lang="es-ES" sz="1200" baseline="0" dirty="0" smtClean="0"/>
-              <a:t> para una diapositiva Información general.</a:t>
-            </a:r>
-            <a:endParaRPr lang="es-ES" sz="1200" dirty="0" smtClean="0"/>
-          </a:p>
-          <a:p>
-            <a:pPr marL="228600" indent="-228600">
-              <a:buFont typeface="+mj-lt"/>
+              <a:rPr lang="es-AR" sz="1200" dirty="0" smtClean="0"/>
+              <a:t>Requerimientos Técnicos</a:t>
+            </a:r>
+          </a:p>
+          <a:p>
+            <a:pPr marL="457200" marR="0" lvl="1" indent="0" algn="l" defTabSz="914400" rtl="0" eaLnBrk="1" fontAlgn="auto" latinLnBrk="0" hangingPunct="1">
+              <a:lnSpc>
+                <a:spcPct val="100000"/>
+              </a:lnSpc>
+              <a:spcBef>
+                <a:spcPts val="0"/>
+              </a:spcBef>
+              <a:spcAft>
+                <a:spcPts val="0"/>
+              </a:spcAft>
+              <a:buClrTx/>
+              <a:buSzTx/>
+              <a:buFontTx/>
               <a:buNone/>
+              <a:tabLst/>
+              <a:defRPr/>
             </a:pPr>
-            <a:endParaRPr lang="es-ES" sz="1200" dirty="0"/>
+            <a:r>
+              <a:rPr lang="es-AR" sz="1200" dirty="0" smtClean="0"/>
+              <a:t>Servidor dedicado para alojamiento de la aplicación y la </a:t>
+            </a:r>
+            <a:r>
+              <a:rPr lang="es-AR" sz="1200" dirty="0" err="1" smtClean="0"/>
+              <a:t>bd</a:t>
+            </a:r>
+            <a:r>
+              <a:rPr lang="es-AR" sz="1200" dirty="0" smtClean="0"/>
+              <a:t> (sistema operativo </a:t>
+            </a:r>
+            <a:r>
+              <a:rPr lang="es-AR" sz="1200" dirty="0" err="1" smtClean="0"/>
+              <a:t>windows</a:t>
+            </a:r>
+            <a:r>
+              <a:rPr lang="es-AR" sz="1200" dirty="0" smtClean="0"/>
+              <a:t> 2003 o superior)</a:t>
+            </a:r>
+          </a:p>
+          <a:p>
+            <a:pPr marL="457200" marR="0" lvl="1" indent="0" algn="l" defTabSz="914400" rtl="0" eaLnBrk="1" fontAlgn="auto" latinLnBrk="0" hangingPunct="1">
+              <a:lnSpc>
+                <a:spcPct val="100000"/>
+              </a:lnSpc>
+              <a:spcBef>
+                <a:spcPts val="0"/>
+              </a:spcBef>
+              <a:spcAft>
+                <a:spcPts val="0"/>
+              </a:spcAft>
+              <a:buClrTx/>
+              <a:buSzTx/>
+              <a:buFontTx/>
+              <a:buNone/>
+              <a:tabLst/>
+              <a:defRPr/>
+            </a:pPr>
+            <a:r>
+              <a:rPr lang="es-AR" sz="1200" dirty="0" smtClean="0"/>
+              <a:t>Internet </a:t>
+            </a:r>
+            <a:r>
+              <a:rPr lang="es-AR" sz="1200" dirty="0" err="1" smtClean="0"/>
+              <a:t>Information</a:t>
+            </a:r>
+            <a:r>
+              <a:rPr lang="es-AR" sz="1200" dirty="0" smtClean="0"/>
+              <a:t> Server</a:t>
+            </a:r>
+          </a:p>
+          <a:p>
+            <a:pPr marL="457200" marR="0" lvl="1" indent="0" algn="l" defTabSz="914400" rtl="0" eaLnBrk="1" fontAlgn="auto" latinLnBrk="0" hangingPunct="1">
+              <a:lnSpc>
+                <a:spcPct val="100000"/>
+              </a:lnSpc>
+              <a:spcBef>
+                <a:spcPts val="0"/>
+              </a:spcBef>
+              <a:spcAft>
+                <a:spcPts val="0"/>
+              </a:spcAft>
+              <a:buClrTx/>
+              <a:buSzTx/>
+              <a:buFontTx/>
+              <a:buNone/>
+              <a:tabLst/>
+              <a:defRPr/>
+            </a:pPr>
+            <a:r>
+              <a:rPr lang="es-AR" sz="1200" dirty="0" smtClean="0"/>
+              <a:t>Conexión para el acceso a internet</a:t>
+            </a:r>
+          </a:p>
+          <a:p>
+            <a:pPr marL="457200" marR="0" lvl="1" indent="0" algn="l" defTabSz="914400" rtl="0" eaLnBrk="1" fontAlgn="auto" latinLnBrk="0" hangingPunct="1">
+              <a:lnSpc>
+                <a:spcPct val="100000"/>
+              </a:lnSpc>
+              <a:spcBef>
+                <a:spcPts val="0"/>
+              </a:spcBef>
+              <a:spcAft>
+                <a:spcPts val="0"/>
+              </a:spcAft>
+              <a:buClrTx/>
+              <a:buSzTx/>
+              <a:buFontTx/>
+              <a:buNone/>
+              <a:tabLst/>
+              <a:defRPr/>
+            </a:pPr>
+            <a:r>
+              <a:rPr lang="es-AR" sz="1200" dirty="0" smtClean="0"/>
+              <a:t>Modem GSM</a:t>
+            </a:r>
+          </a:p>
+          <a:p>
+            <a:pPr marL="457200" marR="0" lvl="1" indent="0" algn="l" defTabSz="914400" rtl="0" eaLnBrk="1" fontAlgn="auto" latinLnBrk="0" hangingPunct="1">
+              <a:lnSpc>
+                <a:spcPct val="100000"/>
+              </a:lnSpc>
+              <a:spcBef>
+                <a:spcPts val="0"/>
+              </a:spcBef>
+              <a:spcAft>
+                <a:spcPts val="0"/>
+              </a:spcAft>
+              <a:buClrTx/>
+              <a:buSzTx/>
+              <a:buFontTx/>
+              <a:buNone/>
+              <a:tabLst/>
+              <a:defRPr/>
+            </a:pPr>
+            <a:r>
+              <a:rPr lang="es-AR" sz="1200" dirty="0" smtClean="0"/>
+              <a:t>Mozilla Firefox (a partir de la versión 3.6)</a:t>
+            </a:r>
+          </a:p>
+          <a:p>
+            <a:pPr marL="457200" marR="0" lvl="1" indent="0" algn="l" defTabSz="914400" rtl="0" eaLnBrk="1" fontAlgn="auto" latinLnBrk="0" hangingPunct="1">
+              <a:lnSpc>
+                <a:spcPct val="100000"/>
+              </a:lnSpc>
+              <a:spcBef>
+                <a:spcPts val="0"/>
+              </a:spcBef>
+              <a:spcAft>
+                <a:spcPts val="0"/>
+              </a:spcAft>
+              <a:buClrTx/>
+              <a:buSzTx/>
+              <a:buFontTx/>
+              <a:buNone/>
+              <a:tabLst/>
+              <a:defRPr/>
+            </a:pPr>
+            <a:r>
+              <a:rPr lang="es-AR" sz="1200" dirty="0" smtClean="0"/>
+              <a:t>SQL Server 2008 R2</a:t>
+            </a:r>
+          </a:p>
+          <a:p>
+            <a:pPr marL="0" marR="0" indent="0" algn="l" defTabSz="914400" rtl="0" eaLnBrk="1" fontAlgn="auto" latinLnBrk="0" hangingPunct="1">
+              <a:lnSpc>
+                <a:spcPct val="100000"/>
+              </a:lnSpc>
+              <a:spcBef>
+                <a:spcPts val="0"/>
+              </a:spcBef>
+              <a:spcAft>
+                <a:spcPts val="0"/>
+              </a:spcAft>
+              <a:buClrTx/>
+              <a:buSzTx/>
+              <a:buFontTx/>
+              <a:buNone/>
+              <a:tabLst/>
+              <a:defRPr/>
+            </a:pPr>
+            <a:r>
+              <a:rPr lang="es-AR" sz="1200" dirty="0" smtClean="0"/>
+              <a:t>Personal</a:t>
+            </a:r>
+          </a:p>
+          <a:p>
+            <a:pPr marL="457200" marR="0" lvl="1" indent="0" algn="l" defTabSz="914400" rtl="0" eaLnBrk="1" fontAlgn="auto" latinLnBrk="0" hangingPunct="1">
+              <a:lnSpc>
+                <a:spcPct val="100000"/>
+              </a:lnSpc>
+              <a:spcBef>
+                <a:spcPts val="0"/>
+              </a:spcBef>
+              <a:spcAft>
+                <a:spcPts val="0"/>
+              </a:spcAft>
+              <a:buClrTx/>
+              <a:buSzTx/>
+              <a:buFontTx/>
+              <a:buNone/>
+              <a:tabLst/>
+              <a:defRPr/>
+            </a:pPr>
+            <a:r>
+              <a:rPr lang="es-AR" sz="1200" dirty="0" smtClean="0"/>
+              <a:t>Capacitado y con experiencia en las distintas etapas del desarrollo</a:t>
+            </a:r>
+          </a:p>
+          <a:p>
+            <a:pPr marL="0" marR="0" indent="0" algn="l" defTabSz="914400" rtl="0" eaLnBrk="1" fontAlgn="auto" latinLnBrk="0" hangingPunct="1">
+              <a:lnSpc>
+                <a:spcPct val="100000"/>
+              </a:lnSpc>
+              <a:spcBef>
+                <a:spcPts val="0"/>
+              </a:spcBef>
+              <a:spcAft>
+                <a:spcPts val="0"/>
+              </a:spcAft>
+              <a:buClrTx/>
+              <a:buSzTx/>
+              <a:buFontTx/>
+              <a:buNone/>
+              <a:tabLst/>
+              <a:defRPr/>
+            </a:pPr>
+            <a:r>
+              <a:rPr lang="es-AR" sz="1200" dirty="0" smtClean="0"/>
+              <a:t>		</a:t>
+            </a:r>
+          </a:p>
+          <a:p>
+            <a:pPr marL="0" marR="0" indent="0" algn="l" defTabSz="914400" rtl="0" eaLnBrk="1" fontAlgn="auto" latinLnBrk="0" hangingPunct="1">
+              <a:lnSpc>
+                <a:spcPct val="100000"/>
+              </a:lnSpc>
+              <a:spcBef>
+                <a:spcPts val="0"/>
+              </a:spcBef>
+              <a:spcAft>
+                <a:spcPts val="0"/>
+              </a:spcAft>
+              <a:buClrTx/>
+              <a:buSzTx/>
+              <a:buFontTx/>
+              <a:buNone/>
+              <a:tabLst/>
+              <a:defRPr/>
+            </a:pPr>
+            <a:r>
+              <a:rPr lang="es-AR" sz="1200" dirty="0" smtClean="0"/>
+              <a:t>Es factible técnicamente, ya que se cuenta con la tecnología necesaria para llevar adelante el proyecto</a:t>
+            </a:r>
+            <a:endParaRPr lang="es-AR" dirty="0"/>
           </a:p>
         </p:txBody>
       </p:sp>
       <p:sp>
         <p:nvSpPr>
-          <p:cNvPr id="5" name="Slide Image Placeholder 4"/>
-          <p:cNvSpPr>
-            <a:spLocks noGrp="1" noRot="1" noChangeAspect="1"/>
-          </p:cNvSpPr>
-          <p:nvPr>
-            <p:ph type="sldImg"/>
-          </p:nvPr>
-        </p:nvSpPr>
-        <p:spPr>
-          <a:xfrm>
-            <a:off x="539750" y="503238"/>
-            <a:ext cx="3143250" cy="2359025"/>
-          </a:xfrm>
-        </p:spPr>
+          <p:cNvPr id="4" name="3 Marcador de número de diapositiva"/>
+          <p:cNvSpPr>
+            <a:spLocks noGrp="1"/>
+          </p:cNvSpPr>
+          <p:nvPr>
+            <p:ph type="sldNum" sz="quarter" idx="10"/>
+          </p:nvPr>
+        </p:nvSpPr>
+        <p:spPr/>
+        <p:txBody>
+          <a:bodyPr/>
+          <a:lstStyle/>
+          <a:p>
+            <a:fld id="{75693FD4-8F83-4EF7-AC3F-0DC0388986B0}" type="slidenum">
+              <a:rPr lang="es-AR" smtClean="0"/>
+              <a:pPr/>
+              <a:t>12</a:t>
+            </a:fld>
+            <a:endParaRPr lang="es-AR"/>
+          </a:p>
+        </p:txBody>
       </p:sp>
     </p:spTree>
+    <p:extLst>
+      <p:ext uri="{BB962C8B-B14F-4D97-AF65-F5344CB8AC3E}">
+        <p14:creationId xmlns:p14="http://schemas.microsoft.com/office/powerpoint/2010/main" val="1655389598"/>
+      </p:ext>
+    </p:extLst>
   </p:cSld>
   <p:clrMapOvr>
     <a:masterClrMapping/>
@@ -5429,132 +6153,157 @@
       </p:grpSpPr>
       <p:sp>
         <p:nvSpPr>
-          <p:cNvPr id="41986" name="Rectangle 23"/>
-          <p:cNvSpPr>
-            <a:spLocks noGrp="1" noChangeArrowheads="1"/>
-          </p:cNvSpPr>
-          <p:nvPr>
-            <p:ph type="hdr" sz="quarter"/>
-          </p:nvPr>
-        </p:nvSpPr>
-        <p:spPr>
-          <a:noFill/>
-        </p:spPr>
+          <p:cNvPr id="2" name="1 Marcador de imagen de diapositiva"/>
+          <p:cNvSpPr>
+            <a:spLocks noGrp="1" noRot="1" noChangeAspect="1"/>
+          </p:cNvSpPr>
+          <p:nvPr>
+            <p:ph type="sldImg"/>
+          </p:nvPr>
+        </p:nvSpPr>
+        <p:spPr/>
+      </p:sp>
+      <p:sp>
+        <p:nvSpPr>
+          <p:cNvPr id="3" name="2 Marcador de notas"/>
+          <p:cNvSpPr>
+            <a:spLocks noGrp="1"/>
+          </p:cNvSpPr>
+          <p:nvPr>
+            <p:ph type="body" idx="1"/>
+          </p:nvPr>
+        </p:nvSpPr>
+        <p:spPr/>
         <p:txBody>
           <a:bodyPr/>
           <a:lstStyle/>
           <a:p>
-            <a:r>
-              <a:rPr lang="es-ES" dirty="0" smtClean="0"/>
-              <a:t>Microsoft </a:t>
-            </a:r>
-            <a:r>
-              <a:rPr lang="es-ES" b="1" dirty="0" smtClean="0"/>
-              <a:t>Excelencia en ingeniería</a:t>
-            </a:r>
-            <a:endParaRPr lang="es-ES" dirty="0" smtClean="0"/>
+            <a:pPr marL="0" marR="0" indent="0" algn="l" defTabSz="914400" rtl="0" eaLnBrk="1" fontAlgn="auto" latinLnBrk="0" hangingPunct="1">
+              <a:lnSpc>
+                <a:spcPct val="100000"/>
+              </a:lnSpc>
+              <a:spcBef>
+                <a:spcPts val="0"/>
+              </a:spcBef>
+              <a:spcAft>
+                <a:spcPts val="0"/>
+              </a:spcAft>
+              <a:buClrTx/>
+              <a:buSzTx/>
+              <a:buFontTx/>
+              <a:buNone/>
+              <a:tabLst/>
+              <a:defRPr/>
+            </a:pPr>
+            <a:r>
+              <a:rPr lang="es-AR" dirty="0" smtClean="0"/>
+              <a:t>Reducción del margen de error: el sistema permitirá contar con información actualizada para la toma de decisiones.</a:t>
+            </a:r>
+          </a:p>
+          <a:p>
+            <a:pPr marL="0" marR="0" indent="0" algn="l" defTabSz="914400" rtl="0" eaLnBrk="1" fontAlgn="auto" latinLnBrk="0" hangingPunct="1">
+              <a:lnSpc>
+                <a:spcPct val="100000"/>
+              </a:lnSpc>
+              <a:spcBef>
+                <a:spcPts val="0"/>
+              </a:spcBef>
+              <a:spcAft>
+                <a:spcPts val="0"/>
+              </a:spcAft>
+              <a:buClrTx/>
+              <a:buSzTx/>
+              <a:buFontTx/>
+              <a:buNone/>
+              <a:tabLst/>
+              <a:defRPr/>
+            </a:pPr>
+            <a:r>
+              <a:rPr lang="es-AR" dirty="0" smtClean="0"/>
+              <a:t>Mayor eficiencia: el sistema podrá ser accedido desde cualquier equipo que cuente con internet, lo cual permitirá la consulta de información en cualquier momento que sea requerido.</a:t>
+            </a:r>
+          </a:p>
+          <a:p>
+            <a:pPr marL="0" marR="0" indent="0" algn="l" defTabSz="914400" rtl="0" eaLnBrk="1" fontAlgn="auto" latinLnBrk="0" hangingPunct="1">
+              <a:lnSpc>
+                <a:spcPct val="100000"/>
+              </a:lnSpc>
+              <a:spcBef>
+                <a:spcPts val="0"/>
+              </a:spcBef>
+              <a:spcAft>
+                <a:spcPts val="0"/>
+              </a:spcAft>
+              <a:buClrTx/>
+              <a:buSzTx/>
+              <a:buFontTx/>
+              <a:buNone/>
+              <a:tabLst/>
+              <a:defRPr/>
+            </a:pPr>
+            <a:r>
+              <a:rPr lang="es-AR" dirty="0" smtClean="0"/>
+              <a:t>Rapidez en el acceso a los datos: al ser un sistema web, sólo será necesario contar con un equipo con acceso a internet y un navegador web para poder acceder a los datos</a:t>
+            </a:r>
+          </a:p>
+          <a:p>
+            <a:pPr marL="0" marR="0" indent="0" algn="l" defTabSz="914400" rtl="0" eaLnBrk="1" fontAlgn="auto" latinLnBrk="0" hangingPunct="1">
+              <a:lnSpc>
+                <a:spcPct val="100000"/>
+              </a:lnSpc>
+              <a:spcBef>
+                <a:spcPts val="0"/>
+              </a:spcBef>
+              <a:spcAft>
+                <a:spcPts val="0"/>
+              </a:spcAft>
+              <a:buClrTx/>
+              <a:buSzTx/>
+              <a:buFontTx/>
+              <a:buNone/>
+              <a:tabLst/>
+              <a:defRPr/>
+            </a:pPr>
+            <a:r>
+              <a:rPr lang="es-AR" dirty="0" smtClean="0"/>
+              <a:t>El proyecto es conveniente desde el punto de vista económico, la que inversión a realizar no es significativa para y el sistema propuesto realizará un gran aporte a la gestión de un establecimiento</a:t>
+            </a:r>
+          </a:p>
+          <a:p>
+            <a:endParaRPr lang="es-AR" dirty="0"/>
           </a:p>
         </p:txBody>
       </p:sp>
       <p:sp>
         <p:nvSpPr>
-          <p:cNvPr id="41987" name="Rectangle 25"/>
-          <p:cNvSpPr>
-            <a:spLocks noGrp="1" noChangeArrowheads="1"/>
-          </p:cNvSpPr>
-          <p:nvPr>
-            <p:ph type="ftr" sz="quarter" idx="4"/>
-          </p:nvPr>
-        </p:nvSpPr>
-        <p:spPr>
-          <a:noFill/>
-        </p:spPr>
+          <p:cNvPr id="4" name="3 Marcador de número de diapositiva"/>
+          <p:cNvSpPr>
+            <a:spLocks noGrp="1"/>
+          </p:cNvSpPr>
+          <p:nvPr>
+            <p:ph type="sldNum" sz="quarter" idx="10"/>
+          </p:nvPr>
+        </p:nvSpPr>
+        <p:spPr/>
         <p:txBody>
           <a:bodyPr/>
           <a:lstStyle/>
           <a:p>
-            <a:r>
-              <a:rPr lang="es-ES" dirty="0" smtClean="0"/>
-              <a:t>Información confidencial de Microsoft</a:t>
-            </a:r>
+            <a:fld id="{75693FD4-8F83-4EF7-AC3F-0DC0388986B0}" type="slidenum">
+              <a:rPr lang="es-AR" smtClean="0"/>
+              <a:pPr/>
+              <a:t>14</a:t>
+            </a:fld>
+            <a:endParaRPr lang="es-AR"/>
           </a:p>
         </p:txBody>
       </p:sp>
-      <p:sp>
-        <p:nvSpPr>
-          <p:cNvPr id="41988" name="Rectangle 26"/>
-          <p:cNvSpPr>
-            <a:spLocks noGrp="1" noChangeArrowheads="1"/>
-          </p:cNvSpPr>
-          <p:nvPr>
-            <p:ph type="sldNum" sz="quarter" idx="5"/>
-          </p:nvPr>
-        </p:nvSpPr>
-        <p:spPr>
-          <a:noFill/>
-        </p:spPr>
-        <p:txBody>
-          <a:bodyPr/>
-          <a:lstStyle/>
-          <a:p>
-            <a:fld id="{B2B44A5F-6CE4-493C-A0D7-6834FF76660C}" type="slidenum">
-              <a:rPr lang="es-ES" smtClean="0"/>
-              <a:pPr/>
-              <a:t>18</a:t>
-            </a:fld>
-            <a:endParaRPr lang="es-ES" dirty="0" smtClean="0"/>
-          </a:p>
-        </p:txBody>
-      </p:sp>
-      <p:sp>
-        <p:nvSpPr>
-          <p:cNvPr id="41989" name="Rectangle 2"/>
-          <p:cNvSpPr>
-            <a:spLocks noGrp="1" noRot="1" noChangeAspect="1" noChangeArrowheads="1" noTextEdit="1"/>
-          </p:cNvSpPr>
-          <p:nvPr>
-            <p:ph type="sldImg"/>
-          </p:nvPr>
-        </p:nvSpPr>
-        <p:spPr>
-          <a:xfrm>
-            <a:off x="1143000" y="450850"/>
-            <a:ext cx="4572000" cy="3429000"/>
-          </a:xfrm>
-          <a:ln/>
-        </p:spPr>
-      </p:sp>
-      <p:sp>
-        <p:nvSpPr>
-          <p:cNvPr id="41990" name="Rectangle 3"/>
-          <p:cNvSpPr>
-            <a:spLocks noGrp="1" noChangeArrowheads="1"/>
-          </p:cNvSpPr>
-          <p:nvPr>
-            <p:ph type="body" idx="1"/>
-          </p:nvPr>
-        </p:nvSpPr>
-        <p:spPr>
-          <a:xfrm>
-            <a:off x="307492" y="4130104"/>
-            <a:ext cx="6261652" cy="4554823"/>
-          </a:xfrm>
-          <a:noFill/>
-          <a:ln/>
-        </p:spPr>
-        <p:txBody>
-          <a:bodyPr/>
-          <a:lstStyle/>
-          <a:p>
-            <a:pPr>
-              <a:buFontTx/>
-              <a:buNone/>
-            </a:pPr>
-            <a:endParaRPr lang="es-ES" dirty="0" smtClean="0"/>
-          </a:p>
-        </p:txBody>
-      </p:sp>
     </p:spTree>
+    <p:extLst>
+      <p:ext uri="{BB962C8B-B14F-4D97-AF65-F5344CB8AC3E}">
+        <p14:creationId xmlns:p14="http://schemas.microsoft.com/office/powerpoint/2010/main" val="3038854116"/>
+      </p:ext>
+    </p:extLst>
   </p:cSld>
   <p:clrMapOvr>
     <a:masterClrMapping/>
@@ -9338,10 +10087,962 @@
   <p:transition spd="slow">
     <p:wipe dir="d"/>
   </p:transition>
+  <p:timing>
+    <p:tnLst>
+      <p:par>
+        <p:cTn id="1" dur="indefinite" restart="never" nodeType="tmRoot"/>
+      </p:par>
+    </p:tnLst>
+  </p:timing>
 </p:sld>
 </file>
 
 <file path=ppt/slides/slide11.xml><?xml version="1.0" encoding="utf-8"?>
+<p:sld xmlns:a="http://schemas.openxmlformats.org/drawingml/2006/main" xmlns:r="http://schemas.openxmlformats.org/officeDocument/2006/relationships" xmlns:p="http://schemas.openxmlformats.org/presentationml/2006/main">
+  <p:cSld>
+    <p:spTree>
+      <p:nvGrpSpPr>
+        <p:cNvPr id="1" name=""/>
+        <p:cNvGrpSpPr/>
+        <p:nvPr/>
+      </p:nvGrpSpPr>
+      <p:grpSpPr>
+        <a:xfrm>
+          <a:off x="0" y="0"/>
+          <a:ext cx="0" cy="0"/>
+          <a:chOff x="0" y="0"/>
+          <a:chExt cx="0" cy="0"/>
+        </a:xfrm>
+      </p:grpSpPr>
+      <p:sp>
+        <p:nvSpPr>
+          <p:cNvPr id="7" name="TextBox 6"/>
+          <p:cNvSpPr txBox="1"/>
+          <p:nvPr/>
+        </p:nvSpPr>
+        <p:spPr>
+          <a:xfrm>
+            <a:off x="2787014" y="2080380"/>
+            <a:ext cx="5206554" cy="3855660"/>
+          </a:xfrm>
+          <a:prstGeom prst="rect">
+            <a:avLst/>
+          </a:prstGeom>
+          <a:noFill/>
+        </p:spPr>
+        <p:txBody>
+          <a:bodyPr wrap="square" rtlCol="0">
+            <a:normAutofit/>
+          </a:bodyPr>
+          <a:lstStyle/>
+          <a:p>
+            <a:pPr algn="ctr"/>
+            <a:endParaRPr lang="es-ES" sz="7200" dirty="0"/>
+          </a:p>
+        </p:txBody>
+      </p:sp>
+      <p:sp>
+        <p:nvSpPr>
+          <p:cNvPr id="2" name="1 Título"/>
+          <p:cNvSpPr>
+            <a:spLocks noGrp="1"/>
+          </p:cNvSpPr>
+          <p:nvPr>
+            <p:ph type="ctrTitle"/>
+          </p:nvPr>
+        </p:nvSpPr>
+        <p:spPr/>
+        <p:txBody>
+          <a:bodyPr>
+            <a:noAutofit/>
+          </a:bodyPr>
+          <a:lstStyle/>
+          <a:p>
+            <a:pPr algn="ctr"/>
+            <a:r>
+              <a:rPr lang="es-ES" sz="7200" dirty="0">
+                <a:solidFill>
+                  <a:schemeClr val="tx1"/>
+                </a:solidFill>
+                <a:latin typeface="+mn-lt"/>
+                <a:ea typeface="+mn-ea"/>
+                <a:cs typeface="+mn-cs"/>
+              </a:rPr>
+              <a:t>Estudio de Factibilidad</a:t>
+            </a:r>
+            <a:br>
+              <a:rPr lang="es-ES" sz="7200" dirty="0">
+                <a:solidFill>
+                  <a:schemeClr val="tx1"/>
+                </a:solidFill>
+                <a:latin typeface="+mn-lt"/>
+                <a:ea typeface="+mn-ea"/>
+                <a:cs typeface="+mn-cs"/>
+              </a:rPr>
+            </a:br>
+            <a:r>
+              <a:rPr lang="es-ES" sz="7200" dirty="0">
+                <a:solidFill>
+                  <a:schemeClr val="tx1"/>
+                </a:solidFill>
+                <a:latin typeface="+mn-lt"/>
+                <a:ea typeface="+mn-ea"/>
+                <a:cs typeface="+mn-cs"/>
+              </a:rPr>
+              <a:t/>
+            </a:r>
+            <a:br>
+              <a:rPr lang="es-ES" sz="7200" dirty="0">
+                <a:solidFill>
+                  <a:schemeClr val="tx1"/>
+                </a:solidFill>
+                <a:latin typeface="+mn-lt"/>
+                <a:ea typeface="+mn-ea"/>
+                <a:cs typeface="+mn-cs"/>
+              </a:rPr>
+            </a:br>
+            <a:endParaRPr lang="es-AR" sz="7200" dirty="0">
+              <a:solidFill>
+                <a:schemeClr val="tx1"/>
+              </a:solidFill>
+              <a:latin typeface="+mn-lt"/>
+              <a:ea typeface="+mn-ea"/>
+              <a:cs typeface="+mn-cs"/>
+            </a:endParaRPr>
+          </a:p>
+        </p:txBody>
+      </p:sp>
+    </p:spTree>
+    <p:extLst>
+      <p:ext uri="{BB962C8B-B14F-4D97-AF65-F5344CB8AC3E}">
+        <p14:creationId xmlns:p14="http://schemas.microsoft.com/office/powerpoint/2010/main" val="3108454464"/>
+      </p:ext>
+    </p:extLst>
+  </p:cSld>
+  <p:clrMapOvr>
+    <a:masterClrMapping/>
+  </p:clrMapOvr>
+  <p:transition spd="slow">
+    <p:push/>
+  </p:transition>
+  <p:timing>
+    <p:tnLst>
+      <p:par>
+        <p:cTn id="1" dur="indefinite" restart="never" nodeType="tmRoot"/>
+      </p:par>
+    </p:tnLst>
+  </p:timing>
+</p:sld>
+</file>
+
+<file path=ppt/slides/slide12.xml><?xml version="1.0" encoding="utf-8"?>
+<p:sld xmlns:a="http://schemas.openxmlformats.org/drawingml/2006/main" xmlns:r="http://schemas.openxmlformats.org/officeDocument/2006/relationships" xmlns:p="http://schemas.openxmlformats.org/presentationml/2006/main">
+  <p:cSld>
+    <p:spTree>
+      <p:nvGrpSpPr>
+        <p:cNvPr id="1" name=""/>
+        <p:cNvGrpSpPr/>
+        <p:nvPr/>
+      </p:nvGrpSpPr>
+      <p:grpSpPr>
+        <a:xfrm>
+          <a:off x="0" y="0"/>
+          <a:ext cx="0" cy="0"/>
+          <a:chOff x="0" y="0"/>
+          <a:chExt cx="0" cy="0"/>
+        </a:xfrm>
+      </p:grpSpPr>
+      <p:sp>
+        <p:nvSpPr>
+          <p:cNvPr id="2" name="1 Título"/>
+          <p:cNvSpPr>
+            <a:spLocks noGrp="1"/>
+          </p:cNvSpPr>
+          <p:nvPr>
+            <p:ph type="title"/>
+          </p:nvPr>
+        </p:nvSpPr>
+        <p:spPr>
+          <a:xfrm>
+            <a:off x="786910" y="188640"/>
+            <a:ext cx="8077200" cy="1143000"/>
+          </a:xfrm>
+        </p:spPr>
+        <p:txBody>
+          <a:bodyPr/>
+          <a:lstStyle/>
+          <a:p>
+            <a:r>
+              <a:rPr lang="es-AR" dirty="0" smtClean="0"/>
+              <a:t>Factibilidad Técnica</a:t>
+            </a:r>
+            <a:endParaRPr lang="es-AR" dirty="0"/>
+          </a:p>
+        </p:txBody>
+      </p:sp>
+      <p:sp>
+        <p:nvSpPr>
+          <p:cNvPr id="3" name="2 Marcador de contenido"/>
+          <p:cNvSpPr>
+            <a:spLocks noGrp="1"/>
+          </p:cNvSpPr>
+          <p:nvPr>
+            <p:ph idx="1"/>
+          </p:nvPr>
+        </p:nvSpPr>
+        <p:spPr>
+          <a:xfrm>
+            <a:off x="815280" y="1340768"/>
+            <a:ext cx="8077200" cy="4896544"/>
+          </a:xfrm>
+        </p:spPr>
+        <p:txBody>
+          <a:bodyPr>
+            <a:normAutofit/>
+          </a:bodyPr>
+          <a:lstStyle/>
+          <a:p>
+            <a:pPr marL="0" indent="0">
+              <a:buNone/>
+            </a:pPr>
+            <a:r>
+              <a:rPr lang="es-AR" b="1" dirty="0"/>
+              <a:t>Requerimientos Técnicos</a:t>
+            </a:r>
+          </a:p>
+          <a:p>
+            <a:pPr lvl="1"/>
+            <a:r>
+              <a:rPr lang="es-AR" dirty="0" smtClean="0"/>
+              <a:t>Servidor </a:t>
+            </a:r>
+            <a:r>
+              <a:rPr lang="es-AR" dirty="0"/>
+              <a:t>dedicado </a:t>
+            </a:r>
+            <a:endParaRPr lang="es-AR" dirty="0" smtClean="0"/>
+          </a:p>
+          <a:p>
+            <a:pPr lvl="1"/>
+            <a:r>
+              <a:rPr lang="es-AR" dirty="0" smtClean="0"/>
+              <a:t>Internet </a:t>
+            </a:r>
+            <a:r>
+              <a:rPr lang="es-AR" dirty="0" err="1"/>
+              <a:t>Information</a:t>
+            </a:r>
+            <a:r>
+              <a:rPr lang="es-AR" dirty="0"/>
+              <a:t> Server</a:t>
+            </a:r>
+          </a:p>
+          <a:p>
+            <a:pPr lvl="1"/>
+            <a:r>
+              <a:rPr lang="es-AR" dirty="0" smtClean="0"/>
+              <a:t>Conexión </a:t>
+            </a:r>
+            <a:r>
+              <a:rPr lang="es-AR" dirty="0"/>
+              <a:t>para el acceso a internet</a:t>
+            </a:r>
+          </a:p>
+          <a:p>
+            <a:pPr lvl="1"/>
+            <a:r>
+              <a:rPr lang="es-AR" dirty="0" smtClean="0"/>
+              <a:t>Modem </a:t>
+            </a:r>
+            <a:r>
+              <a:rPr lang="es-AR" dirty="0"/>
+              <a:t>GSM</a:t>
+            </a:r>
+          </a:p>
+          <a:p>
+            <a:pPr marL="0" indent="0">
+              <a:buNone/>
+            </a:pPr>
+            <a:r>
+              <a:rPr lang="es-AR" b="1" dirty="0" smtClean="0"/>
+              <a:t>Personal</a:t>
+            </a:r>
+            <a:endParaRPr lang="es-AR" b="1" dirty="0"/>
+          </a:p>
+          <a:p>
+            <a:pPr lvl="1"/>
+            <a:r>
+              <a:rPr lang="es-AR" dirty="0" smtClean="0"/>
+              <a:t>Capacitado </a:t>
+            </a:r>
+            <a:r>
+              <a:rPr lang="es-AR" dirty="0"/>
+              <a:t>y con experiencia en las distintas etapas del </a:t>
+            </a:r>
+            <a:r>
+              <a:rPr lang="es-AR" dirty="0" smtClean="0"/>
+              <a:t>desarrollo</a:t>
+            </a:r>
+          </a:p>
+        </p:txBody>
+      </p:sp>
+      <p:pic>
+        <p:nvPicPr>
+          <p:cNvPr id="5" name="4 Imagen"/>
+          <p:cNvPicPr>
+            <a:picLocks noChangeAspect="1"/>
+          </p:cNvPicPr>
+          <p:nvPr/>
+        </p:nvPicPr>
+        <p:blipFill>
+          <a:blip r:embed="rId3">
+            <a:extLst>
+              <a:ext uri="{28A0092B-C50C-407E-A947-70E740481C1C}">
+                <a14:useLocalDpi xmlns:a14="http://schemas.microsoft.com/office/drawing/2010/main" val="0"/>
+              </a:ext>
+            </a:extLst>
+          </a:blip>
+          <a:stretch>
+            <a:fillRect/>
+          </a:stretch>
+        </p:blipFill>
+        <p:spPr>
+          <a:xfrm>
+            <a:off x="5499309" y="1336632"/>
+            <a:ext cx="1600423" cy="1409897"/>
+          </a:xfrm>
+          <a:prstGeom prst="rect">
+            <a:avLst/>
+          </a:prstGeom>
+        </p:spPr>
+      </p:pic>
+      <p:pic>
+        <p:nvPicPr>
+          <p:cNvPr id="6" name="5 Imagen"/>
+          <p:cNvPicPr>
+            <a:picLocks noChangeAspect="1"/>
+          </p:cNvPicPr>
+          <p:nvPr/>
+        </p:nvPicPr>
+        <p:blipFill>
+          <a:blip r:embed="rId4" cstate="email">
+            <a:extLst>
+              <a:ext uri="{28A0092B-C50C-407E-A947-70E740481C1C}">
+                <a14:useLocalDpi xmlns:a14="http://schemas.microsoft.com/office/drawing/2010/main" val="0"/>
+              </a:ext>
+            </a:extLst>
+          </a:blip>
+          <a:stretch>
+            <a:fillRect/>
+          </a:stretch>
+        </p:blipFill>
+        <p:spPr>
+          <a:xfrm>
+            <a:off x="7238554" y="1069702"/>
+            <a:ext cx="1501313" cy="1228897"/>
+          </a:xfrm>
+          <a:prstGeom prst="rect">
+            <a:avLst/>
+          </a:prstGeom>
+        </p:spPr>
+      </p:pic>
+      <p:pic>
+        <p:nvPicPr>
+          <p:cNvPr id="7" name="6 Imagen"/>
+          <p:cNvPicPr>
+            <a:picLocks noChangeAspect="1"/>
+          </p:cNvPicPr>
+          <p:nvPr/>
+        </p:nvPicPr>
+        <p:blipFill>
+          <a:blip r:embed="rId5" cstate="email">
+            <a:extLst>
+              <a:ext uri="{28A0092B-C50C-407E-A947-70E740481C1C}">
+                <a14:useLocalDpi xmlns:a14="http://schemas.microsoft.com/office/drawing/2010/main" val="0"/>
+              </a:ext>
+            </a:extLst>
+          </a:blip>
+          <a:stretch>
+            <a:fillRect/>
+          </a:stretch>
+        </p:blipFill>
+        <p:spPr>
+          <a:xfrm>
+            <a:off x="6982939" y="3284984"/>
+            <a:ext cx="1233487" cy="923925"/>
+          </a:xfrm>
+          <a:prstGeom prst="rect">
+            <a:avLst/>
+          </a:prstGeom>
+        </p:spPr>
+      </p:pic>
+      <p:pic>
+        <p:nvPicPr>
+          <p:cNvPr id="8" name="7 Imagen"/>
+          <p:cNvPicPr>
+            <a:picLocks noChangeAspect="1"/>
+          </p:cNvPicPr>
+          <p:nvPr/>
+        </p:nvPicPr>
+        <p:blipFill>
+          <a:blip r:embed="rId6">
+            <a:extLst>
+              <a:ext uri="{28A0092B-C50C-407E-A947-70E740481C1C}">
+                <a14:useLocalDpi xmlns:a14="http://schemas.microsoft.com/office/drawing/2010/main" val="0"/>
+              </a:ext>
+            </a:extLst>
+          </a:blip>
+          <a:stretch>
+            <a:fillRect/>
+          </a:stretch>
+        </p:blipFill>
+        <p:spPr>
+          <a:xfrm>
+            <a:off x="6299521" y="2460779"/>
+            <a:ext cx="2600325" cy="571500"/>
+          </a:xfrm>
+          <a:prstGeom prst="rect">
+            <a:avLst/>
+          </a:prstGeom>
+        </p:spPr>
+      </p:pic>
+    </p:spTree>
+    <p:extLst>
+      <p:ext uri="{BB962C8B-B14F-4D97-AF65-F5344CB8AC3E}">
+        <p14:creationId xmlns:p14="http://schemas.microsoft.com/office/powerpoint/2010/main" val="1275392766"/>
+      </p:ext>
+    </p:extLst>
+  </p:cSld>
+  <p:clrMapOvr>
+    <a:masterClrMapping/>
+  </p:clrMapOvr>
+  <p:transition spd="slow">
+    <p:wipe dir="d"/>
+  </p:transition>
+  <p:timing>
+    <p:tnLst>
+      <p:par>
+        <p:cTn id="1" dur="indefinite" restart="never" nodeType="tmRoot"/>
+      </p:par>
+    </p:tnLst>
+  </p:timing>
+</p:sld>
+</file>
+
+<file path=ppt/slides/slide13.xml><?xml version="1.0" encoding="utf-8"?>
+<p:sld xmlns:a="http://schemas.openxmlformats.org/drawingml/2006/main" xmlns:r="http://schemas.openxmlformats.org/officeDocument/2006/relationships" xmlns:p="http://schemas.openxmlformats.org/presentationml/2006/main">
+  <p:cSld>
+    <p:spTree>
+      <p:nvGrpSpPr>
+        <p:cNvPr id="1" name=""/>
+        <p:cNvGrpSpPr/>
+        <p:nvPr/>
+      </p:nvGrpSpPr>
+      <p:grpSpPr>
+        <a:xfrm>
+          <a:off x="0" y="0"/>
+          <a:ext cx="0" cy="0"/>
+          <a:chOff x="0" y="0"/>
+          <a:chExt cx="0" cy="0"/>
+        </a:xfrm>
+      </p:grpSpPr>
+      <p:sp>
+        <p:nvSpPr>
+          <p:cNvPr id="2" name="1 Título"/>
+          <p:cNvSpPr>
+            <a:spLocks noGrp="1"/>
+          </p:cNvSpPr>
+          <p:nvPr>
+            <p:ph type="title"/>
+          </p:nvPr>
+        </p:nvSpPr>
+        <p:spPr/>
+        <p:txBody>
+          <a:bodyPr/>
+          <a:lstStyle/>
+          <a:p>
+            <a:r>
+              <a:rPr lang="es-AR" dirty="0" smtClean="0"/>
+              <a:t>Factibilidad Económica</a:t>
+            </a:r>
+            <a:endParaRPr lang="es-AR" dirty="0"/>
+          </a:p>
+        </p:txBody>
+      </p:sp>
+      <p:sp>
+        <p:nvSpPr>
+          <p:cNvPr id="3" name="2 Marcador de contenido"/>
+          <p:cNvSpPr>
+            <a:spLocks noGrp="1"/>
+          </p:cNvSpPr>
+          <p:nvPr>
+            <p:ph idx="1"/>
+          </p:nvPr>
+        </p:nvSpPr>
+        <p:spPr/>
+        <p:txBody>
+          <a:bodyPr/>
+          <a:lstStyle/>
+          <a:p>
+            <a:pPr marL="0" indent="0">
+              <a:buNone/>
+            </a:pPr>
+            <a:r>
+              <a:rPr lang="es-AR" b="1" dirty="0" smtClean="0"/>
+              <a:t>Costos </a:t>
+            </a:r>
+            <a:r>
+              <a:rPr lang="es-AR" b="1" dirty="0"/>
+              <a:t>directos </a:t>
+            </a:r>
+          </a:p>
+          <a:p>
+            <a:pPr lvl="1"/>
+            <a:r>
+              <a:rPr lang="es-AR" dirty="0" smtClean="0"/>
+              <a:t>Servidor </a:t>
+            </a:r>
+            <a:r>
+              <a:rPr lang="es-AR" dirty="0"/>
+              <a:t>Dedicado</a:t>
+            </a:r>
+          </a:p>
+          <a:p>
+            <a:pPr lvl="1"/>
+            <a:r>
+              <a:rPr lang="es-AR" dirty="0" smtClean="0"/>
+              <a:t>Conexión </a:t>
+            </a:r>
+            <a:r>
+              <a:rPr lang="es-AR" dirty="0"/>
+              <a:t>a Internet</a:t>
+            </a:r>
+          </a:p>
+          <a:p>
+            <a:pPr lvl="1"/>
+            <a:r>
+              <a:rPr lang="es-AR" dirty="0" smtClean="0"/>
+              <a:t>Línea </a:t>
+            </a:r>
+            <a:r>
+              <a:rPr lang="es-AR" dirty="0"/>
+              <a:t>celular para envío de mensajes de texto</a:t>
+            </a:r>
+          </a:p>
+        </p:txBody>
+      </p:sp>
+      <p:pic>
+        <p:nvPicPr>
+          <p:cNvPr id="4" name="3 Imagen"/>
+          <p:cNvPicPr>
+            <a:picLocks noChangeAspect="1"/>
+          </p:cNvPicPr>
+          <p:nvPr/>
+        </p:nvPicPr>
+        <p:blipFill>
+          <a:blip r:embed="rId2">
+            <a:extLst>
+              <a:ext uri="{28A0092B-C50C-407E-A947-70E740481C1C}">
+                <a14:useLocalDpi xmlns:a14="http://schemas.microsoft.com/office/drawing/2010/main" val="0"/>
+              </a:ext>
+            </a:extLst>
+          </a:blip>
+          <a:stretch>
+            <a:fillRect/>
+          </a:stretch>
+        </p:blipFill>
+        <p:spPr>
+          <a:xfrm>
+            <a:off x="6065333" y="3933056"/>
+            <a:ext cx="2478182" cy="2301170"/>
+          </a:xfrm>
+          <a:prstGeom prst="rect">
+            <a:avLst/>
+          </a:prstGeom>
+        </p:spPr>
+      </p:pic>
+    </p:spTree>
+    <p:extLst>
+      <p:ext uri="{BB962C8B-B14F-4D97-AF65-F5344CB8AC3E}">
+        <p14:creationId xmlns:p14="http://schemas.microsoft.com/office/powerpoint/2010/main" val="3626640795"/>
+      </p:ext>
+    </p:extLst>
+  </p:cSld>
+  <p:clrMapOvr>
+    <a:masterClrMapping/>
+  </p:clrMapOvr>
+  <p:transition spd="slow">
+    <p:wipe dir="d"/>
+  </p:transition>
+  <p:timing>
+    <p:tnLst>
+      <p:par>
+        <p:cTn id="1" dur="indefinite" restart="never" nodeType="tmRoot"/>
+      </p:par>
+    </p:tnLst>
+  </p:timing>
+</p:sld>
+</file>
+
+<file path=ppt/slides/slide14.xml><?xml version="1.0" encoding="utf-8"?>
+<p:sld xmlns:a="http://schemas.openxmlformats.org/drawingml/2006/main" xmlns:r="http://schemas.openxmlformats.org/officeDocument/2006/relationships" xmlns:p="http://schemas.openxmlformats.org/presentationml/2006/main">
+  <p:cSld>
+    <p:spTree>
+      <p:nvGrpSpPr>
+        <p:cNvPr id="1" name=""/>
+        <p:cNvGrpSpPr/>
+        <p:nvPr/>
+      </p:nvGrpSpPr>
+      <p:grpSpPr>
+        <a:xfrm>
+          <a:off x="0" y="0"/>
+          <a:ext cx="0" cy="0"/>
+          <a:chOff x="0" y="0"/>
+          <a:chExt cx="0" cy="0"/>
+        </a:xfrm>
+      </p:grpSpPr>
+      <p:sp>
+        <p:nvSpPr>
+          <p:cNvPr id="2" name="1 Título"/>
+          <p:cNvSpPr>
+            <a:spLocks noGrp="1"/>
+          </p:cNvSpPr>
+          <p:nvPr>
+            <p:ph type="title"/>
+          </p:nvPr>
+        </p:nvSpPr>
+        <p:spPr/>
+        <p:txBody>
+          <a:bodyPr/>
+          <a:lstStyle/>
+          <a:p>
+            <a:r>
+              <a:rPr lang="es-AR" dirty="0"/>
+              <a:t>Factibilidad Económica</a:t>
+            </a:r>
+          </a:p>
+        </p:txBody>
+      </p:sp>
+      <p:sp>
+        <p:nvSpPr>
+          <p:cNvPr id="3" name="2 Marcador de contenido"/>
+          <p:cNvSpPr>
+            <a:spLocks noGrp="1"/>
+          </p:cNvSpPr>
+          <p:nvPr>
+            <p:ph idx="1"/>
+          </p:nvPr>
+        </p:nvSpPr>
+        <p:spPr/>
+        <p:txBody>
+          <a:bodyPr>
+            <a:normAutofit/>
+          </a:bodyPr>
+          <a:lstStyle/>
+          <a:p>
+            <a:pPr marL="0" indent="0">
+              <a:buNone/>
+            </a:pPr>
+            <a:r>
+              <a:rPr lang="es-AR" sz="3600" b="1" dirty="0" smtClean="0"/>
+              <a:t>Beneficios</a:t>
+            </a:r>
+            <a:endParaRPr lang="es-AR" b="1" dirty="0" smtClean="0"/>
+          </a:p>
+          <a:p>
+            <a:pPr marL="857250" lvl="1" indent="-457200"/>
+            <a:r>
+              <a:rPr lang="es-AR" dirty="0" smtClean="0"/>
+              <a:t>Reducción </a:t>
+            </a:r>
+            <a:r>
+              <a:rPr lang="es-AR" dirty="0"/>
+              <a:t>del margen de </a:t>
+            </a:r>
+            <a:r>
+              <a:rPr lang="es-AR" dirty="0" smtClean="0"/>
+              <a:t>error.</a:t>
+            </a:r>
+            <a:endParaRPr lang="es-AR" dirty="0"/>
+          </a:p>
+          <a:p>
+            <a:pPr marL="857250" lvl="1" indent="-457200"/>
+            <a:r>
+              <a:rPr lang="es-AR" dirty="0" smtClean="0"/>
+              <a:t>Mayor eficiencia.</a:t>
+            </a:r>
+            <a:endParaRPr lang="es-AR" dirty="0"/>
+          </a:p>
+          <a:p>
+            <a:pPr marL="857250" lvl="1" indent="-457200"/>
+            <a:r>
+              <a:rPr lang="es-AR" dirty="0" smtClean="0"/>
+              <a:t>Rapidez </a:t>
+            </a:r>
+            <a:r>
+              <a:rPr lang="es-AR" dirty="0"/>
+              <a:t>en el acceso a los </a:t>
+            </a:r>
+            <a:r>
+              <a:rPr lang="es-AR" dirty="0" smtClean="0"/>
+              <a:t>datos</a:t>
+            </a:r>
+            <a:endParaRPr lang="es-AR" dirty="0"/>
+          </a:p>
+        </p:txBody>
+      </p:sp>
+      <p:pic>
+        <p:nvPicPr>
+          <p:cNvPr id="4" name="3 Imagen"/>
+          <p:cNvPicPr>
+            <a:picLocks noChangeAspect="1"/>
+          </p:cNvPicPr>
+          <p:nvPr/>
+        </p:nvPicPr>
+        <p:blipFill>
+          <a:blip r:embed="rId3">
+            <a:extLst>
+              <a:ext uri="{28A0092B-C50C-407E-A947-70E740481C1C}">
+                <a14:useLocalDpi xmlns:a14="http://schemas.microsoft.com/office/drawing/2010/main" val="0"/>
+              </a:ext>
+            </a:extLst>
+          </a:blip>
+          <a:stretch>
+            <a:fillRect/>
+          </a:stretch>
+        </p:blipFill>
+        <p:spPr>
+          <a:xfrm>
+            <a:off x="6516215" y="1772816"/>
+            <a:ext cx="2242491" cy="3165869"/>
+          </a:xfrm>
+          <a:prstGeom prst="rect">
+            <a:avLst/>
+          </a:prstGeom>
+        </p:spPr>
+      </p:pic>
+    </p:spTree>
+    <p:extLst>
+      <p:ext uri="{BB962C8B-B14F-4D97-AF65-F5344CB8AC3E}">
+        <p14:creationId xmlns:p14="http://schemas.microsoft.com/office/powerpoint/2010/main" val="1253285742"/>
+      </p:ext>
+    </p:extLst>
+  </p:cSld>
+  <p:clrMapOvr>
+    <a:masterClrMapping/>
+  </p:clrMapOvr>
+  <p:transition spd="slow">
+    <p:wipe dir="d"/>
+  </p:transition>
+  <p:timing>
+    <p:tnLst>
+      <p:par>
+        <p:cTn id="1" dur="indefinite" restart="never" nodeType="tmRoot"/>
+      </p:par>
+    </p:tnLst>
+  </p:timing>
+</p:sld>
+</file>
+
+<file path=ppt/slides/slide15.xml><?xml version="1.0" encoding="utf-8"?>
+<p:sld xmlns:a="http://schemas.openxmlformats.org/drawingml/2006/main" xmlns:r="http://schemas.openxmlformats.org/officeDocument/2006/relationships" xmlns:p="http://schemas.openxmlformats.org/presentationml/2006/main">
+  <p:cSld>
+    <p:spTree>
+      <p:nvGrpSpPr>
+        <p:cNvPr id="1" name=""/>
+        <p:cNvGrpSpPr/>
+        <p:nvPr/>
+      </p:nvGrpSpPr>
+      <p:grpSpPr>
+        <a:xfrm>
+          <a:off x="0" y="0"/>
+          <a:ext cx="0" cy="0"/>
+          <a:chOff x="0" y="0"/>
+          <a:chExt cx="0" cy="0"/>
+        </a:xfrm>
+      </p:grpSpPr>
+      <p:sp>
+        <p:nvSpPr>
+          <p:cNvPr id="3" name="2 Marcador de contenido"/>
+          <p:cNvSpPr>
+            <a:spLocks noGrp="1"/>
+          </p:cNvSpPr>
+          <p:nvPr>
+            <p:ph idx="1"/>
+          </p:nvPr>
+        </p:nvSpPr>
+        <p:spPr/>
+        <p:txBody>
+          <a:bodyPr>
+            <a:normAutofit fontScale="92500" lnSpcReduction="10000"/>
+          </a:bodyPr>
+          <a:lstStyle/>
+          <a:p>
+            <a:pPr marL="0" indent="0">
+              <a:buNone/>
+            </a:pPr>
+            <a:r>
+              <a:rPr lang="es-AR" b="1" dirty="0"/>
+              <a:t>¿Cuál es la probabilidad de que el nuevo sistema se use como se supone?</a:t>
+            </a:r>
+          </a:p>
+          <a:p>
+            <a:pPr lvl="1"/>
+            <a:r>
+              <a:rPr lang="es-AR" dirty="0" smtClean="0"/>
+              <a:t>Capacitación </a:t>
+            </a:r>
+            <a:r>
+              <a:rPr lang="es-AR" dirty="0"/>
+              <a:t>de los usuarios</a:t>
+            </a:r>
+          </a:p>
+          <a:p>
+            <a:pPr lvl="1"/>
+            <a:r>
+              <a:rPr lang="es-AR" dirty="0" smtClean="0"/>
+              <a:t>Usuario </a:t>
+            </a:r>
+            <a:r>
+              <a:rPr lang="es-AR" dirty="0"/>
+              <a:t>familiarizado con el uso de una pc y un navegador web</a:t>
+            </a:r>
+          </a:p>
+          <a:p>
+            <a:pPr lvl="1"/>
+            <a:r>
+              <a:rPr lang="es-AR" dirty="0" smtClean="0"/>
+              <a:t>Los módulos </a:t>
+            </a:r>
+            <a:r>
+              <a:rPr lang="es-AR" dirty="0"/>
+              <a:t>que componen el sistema serán instalados paulatinamente, a medida que se capacita al personal</a:t>
+            </a:r>
+          </a:p>
+          <a:p>
+            <a:pPr lvl="1"/>
+            <a:r>
+              <a:rPr lang="es-AR" dirty="0" smtClean="0"/>
+              <a:t>Realizado con las últimas </a:t>
+            </a:r>
+            <a:r>
+              <a:rPr lang="es-AR" dirty="0"/>
+              <a:t>herramientas disponibles en el </a:t>
+            </a:r>
+            <a:r>
+              <a:rPr lang="es-AR" dirty="0" smtClean="0"/>
+              <a:t>mercado.</a:t>
+            </a:r>
+            <a:endParaRPr lang="es-AR" dirty="0"/>
+          </a:p>
+        </p:txBody>
+      </p:sp>
+      <p:pic>
+        <p:nvPicPr>
+          <p:cNvPr id="5" name="4 Imagen"/>
+          <p:cNvPicPr>
+            <a:picLocks noChangeAspect="1"/>
+          </p:cNvPicPr>
+          <p:nvPr/>
+        </p:nvPicPr>
+        <p:blipFill>
+          <a:blip r:embed="rId3">
+            <a:extLst>
+              <a:ext uri="{28A0092B-C50C-407E-A947-70E740481C1C}">
+                <a14:useLocalDpi xmlns:a14="http://schemas.microsoft.com/office/drawing/2010/main" val="0"/>
+              </a:ext>
+            </a:extLst>
+          </a:blip>
+          <a:stretch>
+            <a:fillRect/>
+          </a:stretch>
+        </p:blipFill>
+        <p:spPr>
+          <a:xfrm>
+            <a:off x="6321920" y="1916832"/>
+            <a:ext cx="2846433" cy="2016224"/>
+          </a:xfrm>
+          <a:prstGeom prst="rect">
+            <a:avLst/>
+          </a:prstGeom>
+        </p:spPr>
+      </p:pic>
+      <p:sp>
+        <p:nvSpPr>
+          <p:cNvPr id="2" name="1 Título"/>
+          <p:cNvSpPr>
+            <a:spLocks noGrp="1"/>
+          </p:cNvSpPr>
+          <p:nvPr>
+            <p:ph type="title"/>
+          </p:nvPr>
+        </p:nvSpPr>
+        <p:spPr/>
+        <p:txBody>
+          <a:bodyPr/>
+          <a:lstStyle/>
+          <a:p>
+            <a:r>
+              <a:rPr lang="es-AR" dirty="0"/>
+              <a:t>Factibilidad Operativa</a:t>
+            </a:r>
+          </a:p>
+        </p:txBody>
+      </p:sp>
+      <p:pic>
+        <p:nvPicPr>
+          <p:cNvPr id="4" name="3 Imagen"/>
+          <p:cNvPicPr>
+            <a:picLocks noChangeAspect="1"/>
+          </p:cNvPicPr>
+          <p:nvPr/>
+        </p:nvPicPr>
+        <p:blipFill>
+          <a:blip r:embed="rId4">
+            <a:extLst>
+              <a:ext uri="{28A0092B-C50C-407E-A947-70E740481C1C}">
+                <a14:useLocalDpi xmlns:a14="http://schemas.microsoft.com/office/drawing/2010/main" val="0"/>
+              </a:ext>
+            </a:extLst>
+          </a:blip>
+          <a:stretch>
+            <a:fillRect/>
+          </a:stretch>
+        </p:blipFill>
+        <p:spPr>
+          <a:xfrm>
+            <a:off x="3995935" y="5159233"/>
+            <a:ext cx="2398259" cy="1698767"/>
+          </a:xfrm>
+          <a:prstGeom prst="rect">
+            <a:avLst/>
+          </a:prstGeom>
+        </p:spPr>
+      </p:pic>
+    </p:spTree>
+    <p:extLst>
+      <p:ext uri="{BB962C8B-B14F-4D97-AF65-F5344CB8AC3E}">
+        <p14:creationId xmlns:p14="http://schemas.microsoft.com/office/powerpoint/2010/main" val="3907949654"/>
+      </p:ext>
+    </p:extLst>
+  </p:cSld>
+  <p:clrMapOvr>
+    <a:masterClrMapping/>
+  </p:clrMapOvr>
+  <p:transition spd="slow">
+    <p:wipe dir="d"/>
+  </p:transition>
+  <p:timing>
+    <p:tnLst>
+      <p:par>
+        <p:cTn id="1" dur="indefinite" restart="never" nodeType="tmRoot"/>
+      </p:par>
+    </p:tnLst>
+  </p:timing>
+</p:sld>
+</file>
+
+<file path=ppt/slides/slide16.xml><?xml version="1.0" encoding="utf-8"?>
 <p:sld xmlns:a="http://schemas.openxmlformats.org/drawingml/2006/main" xmlns:r="http://schemas.openxmlformats.org/officeDocument/2006/relationships" xmlns:p="http://schemas.openxmlformats.org/presentationml/2006/main">
   <p:cSld>
     <p:spTree>
@@ -9650,7 +11351,7 @@
 </p:sld>
 </file>
 
-<file path=ppt/slides/slide12.xml><?xml version="1.0" encoding="utf-8"?>
+<file path=ppt/slides/slide17.xml><?xml version="1.0" encoding="utf-8"?>
 <p:sld xmlns:a="http://schemas.openxmlformats.org/drawingml/2006/main" xmlns:r="http://schemas.openxmlformats.org/officeDocument/2006/relationships" xmlns:p="http://schemas.openxmlformats.org/presentationml/2006/main">
   <p:cSld>
     <p:spTree>
@@ -9684,7 +11385,11 @@
           <a:p>
             <a:r>
               <a:rPr lang="es-AR" dirty="0" smtClean="0"/>
-              <a:t>Metodologías Agiles</a:t>
+              <a:t>Metodologías </a:t>
+            </a:r>
+            <a:r>
+              <a:rPr lang="es-AR" dirty="0" smtClean="0"/>
+              <a:t>Ágiles</a:t>
             </a:r>
             <a:endParaRPr lang="es-AR" dirty="0"/>
           </a:p>
@@ -9744,40 +11449,32 @@
       </p:sp>
       <p:pic>
         <p:nvPicPr>
-          <p:cNvPr id="4" name="Picture 3" descr="D:\Profiles\agg029\My Documents\My Pictures\Microsoft Clip Organizer\j0439356.jpg"/>
+          <p:cNvPr id="5" name="4 Imagen"/>
           <p:cNvPicPr>
-            <a:picLocks noChangeAspect="1" noChangeArrowheads="1"/>
+            <a:picLocks noChangeAspect="1"/>
           </p:cNvPicPr>
           <p:nvPr/>
         </p:nvPicPr>
         <p:blipFill>
-          <a:blip r:embed="rId2" cstate="print"/>
-          <a:srcRect/>
+          <a:blip r:embed="rId2">
+            <a:extLst>
+              <a:ext uri="{28A0092B-C50C-407E-A947-70E740481C1C}">
+                <a14:useLocalDpi xmlns:a14="http://schemas.microsoft.com/office/drawing/2010/main" val="0"/>
+              </a:ext>
+            </a:extLst>
+          </a:blip>
           <a:stretch>
             <a:fillRect/>
           </a:stretch>
         </p:blipFill>
-        <p:spPr bwMode="auto">
+        <p:spPr>
           <a:xfrm>
-            <a:off x="3635896" y="3933056"/>
-            <a:ext cx="2448272" cy="2448272"/>
+            <a:off x="2195736" y="3501008"/>
+            <a:ext cx="5081158" cy="3810868"/>
           </a:xfrm>
-          <a:prstGeom prst="roundRect">
-            <a:avLst>
-              <a:gd name="adj" fmla="val 8594"/>
-            </a:avLst>
+          <a:prstGeom prst="rect">
+            <a:avLst/>
           </a:prstGeom>
-          <a:solidFill>
-            <a:srgbClr val="FFFFFF">
-              <a:shade val="85000"/>
-            </a:srgbClr>
-          </a:solidFill>
-          <a:ln>
-            <a:noFill/>
-          </a:ln>
-          <a:effectLst>
-            <a:reflection blurRad="12700" stA="38000" endPos="28000" dist="5000" dir="5400000" sy="-100000" algn="bl" rotWithShape="0"/>
-          </a:effectLst>
         </p:spPr>
       </p:pic>
     </p:spTree>
@@ -9793,10 +11490,17 @@
   <p:transition spd="slow">
     <p:wipe dir="d"/>
   </p:transition>
+  <p:timing>
+    <p:tnLst>
+      <p:par>
+        <p:cTn id="1" dur="indefinite" restart="never" nodeType="tmRoot"/>
+      </p:par>
+    </p:tnLst>
+  </p:timing>
 </p:sld>
 </file>
 
-<file path=ppt/slides/slide13.xml><?xml version="1.0" encoding="utf-8"?>
+<file path=ppt/slides/slide18.xml><?xml version="1.0" encoding="utf-8"?>
 <p:sld xmlns:a="http://schemas.openxmlformats.org/drawingml/2006/main" xmlns:r="http://schemas.openxmlformats.org/officeDocument/2006/relationships" xmlns:p="http://schemas.openxmlformats.org/presentationml/2006/main">
   <p:cSld>
     <p:spTree>
@@ -9899,10 +11603,17 @@
   <p:transition spd="slow">
     <p:wipe dir="d"/>
   </p:transition>
+  <p:timing>
+    <p:tnLst>
+      <p:par>
+        <p:cTn id="1" dur="indefinite" restart="never" nodeType="tmRoot"/>
+      </p:par>
+    </p:tnLst>
+  </p:timing>
 </p:sld>
 </file>
 
-<file path=ppt/slides/slide14.xml><?xml version="1.0" encoding="utf-8"?>
+<file path=ppt/slides/slide19.xml><?xml version="1.0" encoding="utf-8"?>
 <p:sld xmlns:a="http://schemas.openxmlformats.org/drawingml/2006/main" xmlns:r="http://schemas.openxmlformats.org/officeDocument/2006/relationships" xmlns:p="http://schemas.openxmlformats.org/presentationml/2006/main">
   <p:cSld>
     <p:spTree>
@@ -9919,6 +11630,33 @@
           <a:chExt cx="0" cy="0"/>
         </a:xfrm>
       </p:grpSpPr>
+      <p:sp>
+        <p:nvSpPr>
+          <p:cNvPr id="8" name="1 Título"/>
+          <p:cNvSpPr>
+            <a:spLocks noGrp="1"/>
+          </p:cNvSpPr>
+          <p:nvPr>
+            <p:ph type="title"/>
+          </p:nvPr>
+        </p:nvSpPr>
+        <p:spPr/>
+        <p:txBody>
+          <a:bodyPr/>
+          <a:lstStyle/>
+          <a:p>
+            <a:r>
+              <a:rPr lang="es-ES" b="1" i="1" dirty="0" smtClean="0"/>
+              <a:t>Ciclo de Vida de </a:t>
+            </a:r>
+            <a:r>
+              <a:rPr lang="es-ES" b="1" i="1" dirty="0" err="1" smtClean="0"/>
+              <a:t>ScrumUP</a:t>
+            </a:r>
+            <a:endParaRPr lang="es-AR" dirty="0"/>
+          </a:p>
+        </p:txBody>
+      </p:sp>
       <p:pic>
         <p:nvPicPr>
           <p:cNvPr id="4" name="3 Marcador de contenido"/>
@@ -9956,38 +11694,6 @@
           </a:ln>
         </p:spPr>
       </p:pic>
-      <p:sp>
-        <p:nvSpPr>
-          <p:cNvPr id="8" name="1 Título"/>
-          <p:cNvSpPr>
-            <a:spLocks noGrp="1"/>
-          </p:cNvSpPr>
-          <p:nvPr>
-            <p:ph type="title"/>
-          </p:nvPr>
-        </p:nvSpPr>
-        <p:spPr>
-          <a:xfrm>
-            <a:off x="762000" y="269632"/>
-            <a:ext cx="8077200" cy="1143000"/>
-          </a:xfrm>
-        </p:spPr>
-        <p:txBody>
-          <a:bodyPr/>
-          <a:lstStyle/>
-          <a:p>
-            <a:r>
-              <a:rPr lang="es-ES" b="1" i="1" dirty="0" smtClean="0"/>
-              <a:t>Ciclo de Vida de </a:t>
-            </a:r>
-            <a:r>
-              <a:rPr lang="es-ES" b="1" i="1" dirty="0" err="1" smtClean="0"/>
-              <a:t>ScrumUP</a:t>
-            </a:r>
-            <a:endParaRPr lang="es-AR" dirty="0"/>
-          </a:p>
-        </p:txBody>
-      </p:sp>
     </p:spTree>
     <p:extLst>
       <p:ext uri="{BB962C8B-B14F-4D97-AF65-F5344CB8AC3E}">
@@ -10001,10 +11707,173 @@
   <p:transition spd="slow">
     <p:wipe dir="d"/>
   </p:transition>
+  <p:timing>
+    <p:tnLst>
+      <p:par>
+        <p:cTn id="1" dur="indefinite" restart="never" nodeType="tmRoot"/>
+      </p:par>
+    </p:tnLst>
+  </p:timing>
 </p:sld>
 </file>
 
-<file path=ppt/slides/slide15.xml><?xml version="1.0" encoding="utf-8"?>
+<file path=ppt/slides/slide2.xml><?xml version="1.0" encoding="utf-8"?>
+<p:sld xmlns:a="http://schemas.openxmlformats.org/drawingml/2006/main" xmlns:r="http://schemas.openxmlformats.org/officeDocument/2006/relationships" xmlns:p="http://schemas.openxmlformats.org/presentationml/2006/main">
+  <p:cSld>
+    <p:spTree>
+      <p:nvGrpSpPr>
+        <p:cNvPr id="1" name=""/>
+        <p:cNvGrpSpPr/>
+        <p:nvPr/>
+      </p:nvGrpSpPr>
+      <p:grpSpPr>
+        <a:xfrm>
+          <a:off x="0" y="0"/>
+          <a:ext cx="0" cy="0"/>
+          <a:chOff x="0" y="0"/>
+          <a:chExt cx="0" cy="0"/>
+        </a:xfrm>
+      </p:grpSpPr>
+      <p:sp>
+        <p:nvSpPr>
+          <p:cNvPr id="2" name="Title 1"/>
+          <p:cNvSpPr>
+            <a:spLocks noGrp="1"/>
+          </p:cNvSpPr>
+          <p:nvPr>
+            <p:ph type="title"/>
+            <p:custDataLst>
+              <p:tags r:id="rId2"/>
+            </p:custDataLst>
+          </p:nvPr>
+        </p:nvSpPr>
+        <p:spPr/>
+        <p:txBody>
+          <a:bodyPr>
+            <a:normAutofit/>
+          </a:bodyPr>
+          <a:lstStyle/>
+          <a:p>
+            <a:r>
+              <a:rPr lang="es-ES" dirty="0" smtClean="0"/>
+              <a:t>EQUIPO DE TRABAJO</a:t>
+            </a:r>
+            <a:endParaRPr lang="es-ES" dirty="0"/>
+          </a:p>
+        </p:txBody>
+      </p:sp>
+      <p:sp>
+        <p:nvSpPr>
+          <p:cNvPr id="5" name="Content Placeholder 4"/>
+          <p:cNvSpPr>
+            <a:spLocks noGrp="1"/>
+          </p:cNvSpPr>
+          <p:nvPr>
+            <p:ph idx="1"/>
+            <p:custDataLst>
+              <p:tags r:id="rId3"/>
+            </p:custDataLst>
+          </p:nvPr>
+        </p:nvSpPr>
+        <p:spPr/>
+        <p:txBody>
+          <a:bodyPr>
+            <a:normAutofit/>
+          </a:bodyPr>
+          <a:lstStyle/>
+          <a:p>
+            <a:r>
+              <a:rPr lang="es-ES" dirty="0" smtClean="0"/>
+              <a:t>Bazán, María Belén</a:t>
+            </a:r>
+          </a:p>
+          <a:p>
+            <a:r>
+              <a:rPr lang="es-ES" dirty="0" err="1" smtClean="0"/>
+              <a:t>Pastorino</a:t>
+            </a:r>
+            <a:r>
+              <a:rPr lang="es-ES" dirty="0" smtClean="0"/>
+              <a:t>, Laura </a:t>
+            </a:r>
+            <a:r>
+              <a:rPr lang="es-ES" dirty="0" err="1" smtClean="0"/>
+              <a:t>Analia</a:t>
+            </a:r>
+            <a:endParaRPr lang="es-ES" dirty="0" smtClean="0"/>
+          </a:p>
+          <a:p>
+            <a:r>
+              <a:rPr lang="es-ES" dirty="0" smtClean="0"/>
+              <a:t>Nicoliello, Pablo Fabián</a:t>
+            </a:r>
+          </a:p>
+          <a:p>
+            <a:r>
+              <a:rPr lang="es-ES" dirty="0" smtClean="0"/>
+              <a:t>Herrán, Martin Carlos</a:t>
+            </a:r>
+          </a:p>
+          <a:p>
+            <a:pPr marL="0" indent="0">
+              <a:buNone/>
+            </a:pPr>
+            <a:endParaRPr lang="es-ES" dirty="0"/>
+          </a:p>
+        </p:txBody>
+      </p:sp>
+      <p:pic>
+        <p:nvPicPr>
+          <p:cNvPr id="3" name="2 Imagen"/>
+          <p:cNvPicPr>
+            <a:picLocks noChangeAspect="1"/>
+          </p:cNvPicPr>
+          <p:nvPr/>
+        </p:nvPicPr>
+        <p:blipFill>
+          <a:blip r:embed="rId6">
+            <a:extLst>
+              <a:ext uri="{28A0092B-C50C-407E-A947-70E740481C1C}">
+                <a14:useLocalDpi xmlns:a14="http://schemas.microsoft.com/office/drawing/2010/main" val="0"/>
+              </a:ext>
+            </a:extLst>
+          </a:blip>
+          <a:stretch>
+            <a:fillRect/>
+          </a:stretch>
+        </p:blipFill>
+        <p:spPr>
+          <a:xfrm>
+            <a:off x="4582380" y="3610073"/>
+            <a:ext cx="4536504" cy="3402381"/>
+          </a:xfrm>
+          <a:prstGeom prst="rect">
+            <a:avLst/>
+          </a:prstGeom>
+        </p:spPr>
+      </p:pic>
+    </p:spTree>
+    <p:custDataLst>
+      <p:tags r:id="rId1"/>
+    </p:custDataLst>
+  </p:cSld>
+  <p:clrMapOvr>
+    <a:masterClrMapping/>
+  </p:clrMapOvr>
+  <p:transition spd="slow">
+    <p:wipe dir="d"/>
+  </p:transition>
+  <p:timing>
+    <p:tnLst>
+      <p:par>
+        <p:cTn id="1" dur="indefinite" restart="never" nodeType="tmRoot"/>
+      </p:par>
+    </p:tnLst>
+  </p:timing>
+</p:sld>
+</file>
+
+<file path=ppt/slides/slide20.xml><?xml version="1.0" encoding="utf-8"?>
 <p:sld xmlns:a="http://schemas.openxmlformats.org/drawingml/2006/main" xmlns:r="http://schemas.openxmlformats.org/officeDocument/2006/relationships" xmlns:p="http://schemas.openxmlformats.org/presentationml/2006/main">
   <p:cSld>
     <p:spTree>
@@ -10611,7 +12480,7 @@
 </p:sld>
 </file>
 
-<file path=ppt/slides/slide16.xml><?xml version="1.0" encoding="utf-8"?>
+<file path=ppt/slides/slide21.xml><?xml version="1.0" encoding="utf-8"?>
 <p:sld xmlns:a="http://schemas.openxmlformats.org/drawingml/2006/main" xmlns:r="http://schemas.openxmlformats.org/officeDocument/2006/relationships" xmlns:p="http://schemas.openxmlformats.org/presentationml/2006/main">
   <p:cSld>
     <p:spTree>
@@ -10751,6 +12620,156 @@
           </a:p>
         </p:txBody>
       </p:sp>
+      <p:pic>
+        <p:nvPicPr>
+          <p:cNvPr id="4" name="3 Imagen"/>
+          <p:cNvPicPr>
+            <a:picLocks noChangeAspect="1"/>
+          </p:cNvPicPr>
+          <p:nvPr/>
+        </p:nvPicPr>
+        <p:blipFill>
+          <a:blip r:embed="rId2">
+            <a:extLst>
+              <a:ext uri="{28A0092B-C50C-407E-A947-70E740481C1C}">
+                <a14:useLocalDpi xmlns:a14="http://schemas.microsoft.com/office/drawing/2010/main" val="0"/>
+              </a:ext>
+            </a:extLst>
+          </a:blip>
+          <a:stretch>
+            <a:fillRect/>
+          </a:stretch>
+        </p:blipFill>
+        <p:spPr>
+          <a:xfrm>
+            <a:off x="5507167" y="3746460"/>
+            <a:ext cx="2891929" cy="2891929"/>
+          </a:xfrm>
+          <a:prstGeom prst="rect">
+            <a:avLst/>
+          </a:prstGeom>
+        </p:spPr>
+      </p:pic>
+      <p:pic>
+        <p:nvPicPr>
+          <p:cNvPr id="5" name="4 Imagen"/>
+          <p:cNvPicPr>
+            <a:picLocks noChangeAspect="1"/>
+          </p:cNvPicPr>
+          <p:nvPr/>
+        </p:nvPicPr>
+        <p:blipFill>
+          <a:blip r:embed="rId3">
+            <a:extLst>
+              <a:ext uri="{28A0092B-C50C-407E-A947-70E740481C1C}">
+                <a14:useLocalDpi xmlns:a14="http://schemas.microsoft.com/office/drawing/2010/main" val="0"/>
+              </a:ext>
+            </a:extLst>
+          </a:blip>
+          <a:stretch>
+            <a:fillRect/>
+          </a:stretch>
+        </p:blipFill>
+        <p:spPr>
+          <a:xfrm>
+            <a:off x="3498017" y="1856502"/>
+            <a:ext cx="2493413" cy="2493413"/>
+          </a:xfrm>
+          <a:prstGeom prst="rect">
+            <a:avLst/>
+          </a:prstGeom>
+        </p:spPr>
+      </p:pic>
+      <p:pic>
+        <p:nvPicPr>
+          <p:cNvPr id="6" name="5 Imagen"/>
+          <p:cNvPicPr>
+            <a:picLocks noChangeAspect="1"/>
+          </p:cNvPicPr>
+          <p:nvPr/>
+        </p:nvPicPr>
+        <p:blipFill>
+          <a:blip r:embed="rId4">
+            <a:extLst>
+              <a:ext uri="{28A0092B-C50C-407E-A947-70E740481C1C}">
+                <a14:useLocalDpi xmlns:a14="http://schemas.microsoft.com/office/drawing/2010/main" val="0"/>
+              </a:ext>
+            </a:extLst>
+          </a:blip>
+          <a:stretch>
+            <a:fillRect/>
+          </a:stretch>
+        </p:blipFill>
+        <p:spPr>
+          <a:xfrm>
+            <a:off x="3952741" y="4365104"/>
+            <a:ext cx="1583967" cy="2273285"/>
+          </a:xfrm>
+          <a:prstGeom prst="rect">
+            <a:avLst/>
+          </a:prstGeom>
+        </p:spPr>
+      </p:pic>
+      <p:pic>
+        <p:nvPicPr>
+          <p:cNvPr id="7" name="6 Imagen"/>
+          <p:cNvPicPr>
+            <a:picLocks noChangeAspect="1"/>
+          </p:cNvPicPr>
+          <p:nvPr/>
+        </p:nvPicPr>
+        <p:blipFill>
+          <a:blip r:embed="rId5">
+            <a:extLst>
+              <a:ext uri="{28A0092B-C50C-407E-A947-70E740481C1C}">
+                <a14:useLocalDpi xmlns:a14="http://schemas.microsoft.com/office/drawing/2010/main" val="0"/>
+              </a:ext>
+            </a:extLst>
+          </a:blip>
+          <a:stretch>
+            <a:fillRect/>
+          </a:stretch>
+        </p:blipFill>
+        <p:spPr>
+          <a:xfrm>
+            <a:off x="4767296" y="-107306"/>
+            <a:ext cx="2930739" cy="2235116"/>
+          </a:xfrm>
+          <a:prstGeom prst="rect">
+            <a:avLst/>
+          </a:prstGeom>
+        </p:spPr>
+      </p:pic>
+      <p:pic>
+        <p:nvPicPr>
+          <p:cNvPr id="8" name="7 Imagen"/>
+          <p:cNvPicPr>
+            <a:picLocks noChangeAspect="1"/>
+          </p:cNvPicPr>
+          <p:nvPr/>
+        </p:nvPicPr>
+        <p:blipFill>
+          <a:blip r:embed="rId6">
+            <a:extLst>
+              <a:ext uri="{28A0092B-C50C-407E-A947-70E740481C1C}">
+                <a14:useLocalDpi xmlns:a14="http://schemas.microsoft.com/office/drawing/2010/main" val="0"/>
+              </a:ext>
+            </a:extLst>
+          </a:blip>
+          <a:stretch>
+            <a:fillRect/>
+          </a:stretch>
+        </p:blipFill>
+        <p:spPr>
+          <a:xfrm>
+            <a:off x="6932080" y="1637974"/>
+            <a:ext cx="2711941" cy="2711941"/>
+          </a:xfrm>
+          <a:prstGeom prst="rect">
+            <a:avLst/>
+          </a:prstGeom>
+        </p:spPr>
+      </p:pic>
     </p:spTree>
     <p:extLst>
       <p:ext uri="{BB962C8B-B14F-4D97-AF65-F5344CB8AC3E}">
@@ -10764,10 +12783,17 @@
   <p:transition spd="slow">
     <p:wipe dir="d"/>
   </p:transition>
+  <p:timing>
+    <p:tnLst>
+      <p:par>
+        <p:cTn id="1" dur="indefinite" restart="never" nodeType="tmRoot"/>
+      </p:par>
+    </p:tnLst>
+  </p:timing>
 </p:sld>
 </file>
 
-<file path=ppt/slides/slide17.xml><?xml version="1.0" encoding="utf-8"?>
+<file path=ppt/slides/slide22.xml><?xml version="1.0" encoding="utf-8"?>
 <p:sld xmlns:a="http://schemas.openxmlformats.org/drawingml/2006/main" xmlns:r="http://schemas.openxmlformats.org/officeDocument/2006/relationships" xmlns:p="http://schemas.openxmlformats.org/presentationml/2006/main">
   <p:cSld>
     <p:spTree>
@@ -11044,10 +13070,17 @@
   <p:transition spd="slow">
     <p:wipe dir="d"/>
   </p:transition>
+  <p:timing>
+    <p:tnLst>
+      <p:par>
+        <p:cTn id="1" dur="indefinite" restart="never" nodeType="tmRoot"/>
+      </p:par>
+    </p:tnLst>
+  </p:timing>
 </p:sld>
 </file>
 
-<file path=ppt/slides/slide18.xml><?xml version="1.0" encoding="utf-8"?>
+<file path=ppt/slides/slide23.xml><?xml version="1.0" encoding="utf-8"?>
 <p:sld xmlns:a="http://schemas.openxmlformats.org/drawingml/2006/main" xmlns:r="http://schemas.openxmlformats.org/officeDocument/2006/relationships" xmlns:p="http://schemas.openxmlformats.org/presentationml/2006/main">
   <p:cSld>
     <p:spTree>
@@ -11094,6 +13127,36 @@
           </a:p>
         </p:txBody>
       </p:sp>
+      <p:pic>
+        <p:nvPicPr>
+          <p:cNvPr id="2" name="1 Imagen"/>
+          <p:cNvPicPr>
+            <a:picLocks noChangeAspect="1"/>
+          </p:cNvPicPr>
+          <p:nvPr/>
+        </p:nvPicPr>
+        <p:blipFill>
+          <a:blip r:embed="rId5">
+            <a:extLst>
+              <a:ext uri="{28A0092B-C50C-407E-A947-70E740481C1C}">
+                <a14:useLocalDpi xmlns:a14="http://schemas.microsoft.com/office/drawing/2010/main" val="0"/>
+              </a:ext>
+            </a:extLst>
+          </a:blip>
+          <a:stretch>
+            <a:fillRect/>
+          </a:stretch>
+        </p:blipFill>
+        <p:spPr>
+          <a:xfrm>
+            <a:off x="1474204" y="1943889"/>
+            <a:ext cx="4176464" cy="4157903"/>
+          </a:xfrm>
+          <a:prstGeom prst="rect">
+            <a:avLst/>
+          </a:prstGeom>
+        </p:spPr>
+      </p:pic>
     </p:spTree>
     <p:custDataLst>
       <p:tags r:id="rId1"/>
@@ -11115,7 +13178,7 @@
 </p:sld>
 </file>
 
-<file path=ppt/slides/slide19.xml><?xml version="1.0" encoding="utf-8"?>
+<file path=ppt/slides/slide24.xml><?xml version="1.0" encoding="utf-8"?>
 <p:sld xmlns:a="http://schemas.openxmlformats.org/drawingml/2006/main" xmlns:r="http://schemas.openxmlformats.org/officeDocument/2006/relationships" xmlns:p="http://schemas.openxmlformats.org/presentationml/2006/main">
   <p:cSld>
     <p:spTree>
@@ -11161,6 +13224,36 @@
           </a:p>
         </p:txBody>
       </p:sp>
+      <p:pic>
+        <p:nvPicPr>
+          <p:cNvPr id="2" name="1 Imagen"/>
+          <p:cNvPicPr>
+            <a:picLocks noChangeAspect="1"/>
+          </p:cNvPicPr>
+          <p:nvPr/>
+        </p:nvPicPr>
+        <p:blipFill>
+          <a:blip r:embed="rId5">
+            <a:extLst>
+              <a:ext uri="{28A0092B-C50C-407E-A947-70E740481C1C}">
+                <a14:useLocalDpi xmlns:a14="http://schemas.microsoft.com/office/drawing/2010/main" val="0"/>
+              </a:ext>
+            </a:extLst>
+          </a:blip>
+          <a:stretch>
+            <a:fillRect/>
+          </a:stretch>
+        </p:blipFill>
+        <p:spPr>
+          <a:xfrm>
+            <a:off x="1043608" y="2996952"/>
+            <a:ext cx="4094030" cy="3620850"/>
+          </a:xfrm>
+          <a:prstGeom prst="rect">
+            <a:avLst/>
+          </a:prstGeom>
+        </p:spPr>
+      </p:pic>
     </p:spTree>
     <p:custDataLst>
       <p:tags r:id="rId1"/>
@@ -11171,173 +13264,6 @@
   </p:clrMapOvr>
   <p:transition>
     <p:fade/>
-  </p:transition>
-  <p:timing>
-    <p:tnLst>
-      <p:par>
-        <p:cTn id="1" dur="indefinite" restart="never" nodeType="tmRoot"/>
-      </p:par>
-    </p:tnLst>
-  </p:timing>
-</p:sld>
-</file>
-
-<file path=ppt/slides/slide2.xml><?xml version="1.0" encoding="utf-8"?>
-<p:sld xmlns:a="http://schemas.openxmlformats.org/drawingml/2006/main" xmlns:r="http://schemas.openxmlformats.org/officeDocument/2006/relationships" xmlns:p="http://schemas.openxmlformats.org/presentationml/2006/main">
-  <p:cSld>
-    <p:spTree>
-      <p:nvGrpSpPr>
-        <p:cNvPr id="1" name=""/>
-        <p:cNvGrpSpPr/>
-        <p:nvPr/>
-      </p:nvGrpSpPr>
-      <p:grpSpPr>
-        <a:xfrm>
-          <a:off x="0" y="0"/>
-          <a:ext cx="0" cy="0"/>
-          <a:chOff x="0" y="0"/>
-          <a:chExt cx="0" cy="0"/>
-        </a:xfrm>
-      </p:grpSpPr>
-      <p:sp>
-        <p:nvSpPr>
-          <p:cNvPr id="2" name="Title 1"/>
-          <p:cNvSpPr>
-            <a:spLocks noGrp="1"/>
-          </p:cNvSpPr>
-          <p:nvPr>
-            <p:ph type="title"/>
-            <p:custDataLst>
-              <p:tags r:id="rId2"/>
-            </p:custDataLst>
-          </p:nvPr>
-        </p:nvSpPr>
-        <p:spPr/>
-        <p:txBody>
-          <a:bodyPr>
-            <a:normAutofit/>
-          </a:bodyPr>
-          <a:lstStyle/>
-          <a:p>
-            <a:r>
-              <a:rPr lang="es-ES" dirty="0" smtClean="0"/>
-              <a:t>EQUIPO DE TRABAJO</a:t>
-            </a:r>
-            <a:endParaRPr lang="es-ES" dirty="0"/>
-          </a:p>
-        </p:txBody>
-      </p:sp>
-      <p:sp>
-        <p:nvSpPr>
-          <p:cNvPr id="5" name="Content Placeholder 4"/>
-          <p:cNvSpPr>
-            <a:spLocks noGrp="1"/>
-          </p:cNvSpPr>
-          <p:nvPr>
-            <p:ph idx="1"/>
-            <p:custDataLst>
-              <p:tags r:id="rId3"/>
-            </p:custDataLst>
-          </p:nvPr>
-        </p:nvSpPr>
-        <p:spPr/>
-        <p:txBody>
-          <a:bodyPr>
-            <a:normAutofit/>
-          </a:bodyPr>
-          <a:lstStyle/>
-          <a:p>
-            <a:r>
-              <a:rPr lang="es-ES" dirty="0" smtClean="0"/>
-              <a:t>Bazán, María Belén</a:t>
-            </a:r>
-          </a:p>
-          <a:p>
-            <a:r>
-              <a:rPr lang="es-ES" dirty="0" err="1" smtClean="0"/>
-              <a:t>Pastorino</a:t>
-            </a:r>
-            <a:r>
-              <a:rPr lang="es-ES" dirty="0" smtClean="0"/>
-              <a:t>, Laura </a:t>
-            </a:r>
-            <a:r>
-              <a:rPr lang="es-ES" dirty="0" err="1" smtClean="0"/>
-              <a:t>Analia</a:t>
-            </a:r>
-            <a:endParaRPr lang="es-ES" dirty="0" smtClean="0"/>
-          </a:p>
-          <a:p>
-            <a:r>
-              <a:rPr lang="es-ES" dirty="0" smtClean="0"/>
-              <a:t>Nicoliello, Pablo Fabián</a:t>
-            </a:r>
-          </a:p>
-          <a:p>
-            <a:r>
-              <a:rPr lang="es-ES" dirty="0" smtClean="0"/>
-              <a:t>Herrán, Martin Carlos</a:t>
-            </a:r>
-          </a:p>
-          <a:p>
-            <a:pPr marL="0" indent="0">
-              <a:buNone/>
-            </a:pPr>
-            <a:endParaRPr lang="es-ES" dirty="0"/>
-          </a:p>
-        </p:txBody>
-      </p:sp>
-      <p:pic>
-        <p:nvPicPr>
-          <p:cNvPr id="1026" name="Picture 2" descr="D:\Proyecto\blpm\Docs\01-Relevamiento Inicial\Presentacion\Equipete.jpg"/>
-          <p:cNvPicPr>
-            <a:picLocks noChangeAspect="1" noChangeArrowheads="1"/>
-          </p:cNvPicPr>
-          <p:nvPr/>
-        </p:nvPicPr>
-        <p:blipFill>
-          <a:blip r:embed="rId6">
-            <a:extLst>
-              <a:ext uri="{28A0092B-C50C-407E-A947-70E740481C1C}">
-                <a14:useLocalDpi xmlns:a14="http://schemas.microsoft.com/office/drawing/2010/main" val="0"/>
-              </a:ext>
-            </a:extLst>
-          </a:blip>
-          <a:srcRect/>
-          <a:stretch>
-            <a:fillRect/>
-          </a:stretch>
-        </p:blipFill>
-        <p:spPr bwMode="auto">
-          <a:xfrm>
-            <a:off x="3059832" y="4077072"/>
-            <a:ext cx="3150542" cy="2362907"/>
-          </a:xfrm>
-          <a:prstGeom prst="rect">
-            <a:avLst/>
-          </a:prstGeom>
-          <a:noFill/>
-          <a:extLst>
-            <a:ext uri="{909E8E84-426E-40DD-AFC4-6F175D3DCCD1}">
-              <a14:hiddenFill xmlns:a14="http://schemas.microsoft.com/office/drawing/2010/main">
-                <a:solidFill>
-                  <a:srgbClr val="FFFFFF"/>
-                </a:solidFill>
-              </a14:hiddenFill>
-            </a:ext>
-          </a:extLst>
-        </p:spPr>
-      </p:pic>
-    </p:spTree>
-    <p:custDataLst>
-      <p:tags r:id="rId1"/>
-    </p:custDataLst>
-  </p:cSld>
-  <p:clrMapOvr>
-    <a:masterClrMapping/>
-  </p:clrMapOvr>
-  <p:transition spd="slow">
-    <p:wipe dir="d"/>
   </p:transition>
   <p:timing>
     <p:tnLst>
@@ -11416,7 +13342,7 @@
           <a:p>
             <a:r>
               <a:rPr lang="es-ES" dirty="0" smtClean="0"/>
-              <a:t>Diagnostico</a:t>
+              <a:t>Diagnóstico</a:t>
             </a:r>
             <a:endParaRPr lang="es-ES" dirty="0"/>
           </a:p>
@@ -11442,6 +13368,36 @@
           </a:p>
         </p:txBody>
       </p:sp>
+      <p:pic>
+        <p:nvPicPr>
+          <p:cNvPr id="3" name="2 Imagen"/>
+          <p:cNvPicPr>
+            <a:picLocks noChangeAspect="1"/>
+          </p:cNvPicPr>
+          <p:nvPr/>
+        </p:nvPicPr>
+        <p:blipFill>
+          <a:blip r:embed="rId6">
+            <a:extLst>
+              <a:ext uri="{28A0092B-C50C-407E-A947-70E740481C1C}">
+                <a14:useLocalDpi xmlns:a14="http://schemas.microsoft.com/office/drawing/2010/main" val="0"/>
+              </a:ext>
+            </a:extLst>
+          </a:blip>
+          <a:stretch>
+            <a:fillRect/>
+          </a:stretch>
+        </p:blipFill>
+        <p:spPr>
+          <a:xfrm>
+            <a:off x="5220071" y="3782858"/>
+            <a:ext cx="3430273" cy="2429777"/>
+          </a:xfrm>
+          <a:prstGeom prst="rect">
+            <a:avLst/>
+          </a:prstGeom>
+        </p:spPr>
+      </p:pic>
     </p:spTree>
     <p:custDataLst>
       <p:tags r:id="rId1"/>
@@ -11508,9 +13464,10 @@
           <a:lstStyle/>
           <a:p>
             <a:r>
-              <a:rPr lang="es-ES" sz="7200" dirty="0"/>
-              <a:t>Diagnostico</a:t>
-            </a:r>
+              <a:rPr lang="es-ES" sz="7200" dirty="0" smtClean="0"/>
+              <a:t>Diagnóstico</a:t>
+            </a:r>
+            <a:endParaRPr lang="es-ES" sz="7200" dirty="0"/>
           </a:p>
         </p:txBody>
       </p:sp>
@@ -11538,6 +13495,36 @@
           <a:xfrm>
             <a:off x="4191000" y="0"/>
             <a:ext cx="7765662" cy="16476125"/>
+          </a:xfrm>
+          <a:prstGeom prst="rect">
+            <a:avLst/>
+          </a:prstGeom>
+        </p:spPr>
+      </p:pic>
+      <p:pic>
+        <p:nvPicPr>
+          <p:cNvPr id="2" name="1 Imagen"/>
+          <p:cNvPicPr>
+            <a:picLocks noChangeAspect="1"/>
+          </p:cNvPicPr>
+          <p:nvPr/>
+        </p:nvPicPr>
+        <p:blipFill>
+          <a:blip r:embed="rId4">
+            <a:extLst>
+              <a:ext uri="{28A0092B-C50C-407E-A947-70E740481C1C}">
+                <a14:useLocalDpi xmlns:a14="http://schemas.microsoft.com/office/drawing/2010/main" val="0"/>
+              </a:ext>
+            </a:extLst>
+          </a:blip>
+          <a:stretch>
+            <a:fillRect/>
+          </a:stretch>
+        </p:blipFill>
+        <p:spPr>
+          <a:xfrm>
+            <a:off x="4788024" y="3715470"/>
+            <a:ext cx="3826352" cy="2866070"/>
           </a:xfrm>
           <a:prstGeom prst="rect">
             <a:avLst/>
@@ -11679,6 +13666,13 @@
   <p:transition spd="slow">
     <p:wipe dir="d"/>
   </p:transition>
+  <p:timing>
+    <p:tnLst>
+      <p:par>
+        <p:cTn id="1" dur="indefinite" restart="never" nodeType="tmRoot"/>
+      </p:par>
+    </p:tnLst>
+  </p:timing>
 </p:sld>
 </file>
 
@@ -11827,6 +13821,13 @@
   <p:transition spd="slow">
     <p:wipe dir="d"/>
   </p:transition>
+  <p:timing>
+    <p:tnLst>
+      <p:par>
+        <p:cTn id="1" dur="indefinite" restart="never" nodeType="tmRoot"/>
+      </p:par>
+    </p:tnLst>
+  </p:timing>
 </p:sld>
 </file>
 
@@ -11907,7 +13908,15 @@
           <a:p>
             <a:r>
               <a:rPr lang="es-AR" dirty="0" smtClean="0"/>
-              <a:t>Dar soporte a los actores en sus diferentes roles, adecuando la información a su propia necesidad.</a:t>
+              <a:t>Dar soporte a los </a:t>
+            </a:r>
+            <a:r>
+              <a:rPr lang="es-AR" dirty="0" smtClean="0"/>
+              <a:t>diferentes actores, </a:t>
+            </a:r>
+            <a:r>
+              <a:rPr lang="es-AR" dirty="0" smtClean="0"/>
+              <a:t>adecuando la información a su propia necesidad.</a:t>
             </a:r>
             <a:endParaRPr lang="es-AR" dirty="0"/>
           </a:p>

</xml_diff>

<commit_message>
Lau - modificación en propuesta
</commit_message>
<xml_diff>
--- a/Docs/01-Relevamiento Inicial/Presentacion/PrimeraExposicion - Resumida.pptx
+++ b/Docs/01-Relevamiento Inicial/Presentacion/PrimeraExposicion - Resumida.pptx
@@ -3876,7 +3876,7 @@
             <a:fld id="{D83FDC75-7F73-4A4A-A77C-09AADF00E0EA}" type="datetimeFigureOut">
               <a:rPr lang="es-ES" smtClean="0"/>
               <a:pPr/>
-              <a:t>08/05/2011</a:t>
+              <a:t>09/05/2011</a:t>
             </a:fld>
             <a:endParaRPr lang="es-ES" dirty="0"/>
           </a:p>
@@ -10035,7 +10035,9 @@
         </p:nvSpPr>
         <p:spPr/>
         <p:txBody>
-          <a:bodyPr/>
+          <a:bodyPr>
+            <a:normAutofit/>
+          </a:bodyPr>
           <a:lstStyle/>
           <a:p>
             <a:r>
@@ -10048,6 +10050,15 @@
           </a:p>
           <a:p>
             <a:r>
+              <a:rPr lang="es-AR" dirty="0"/>
+              <a:t>Acceso WEB</a:t>
+            </a:r>
+          </a:p>
+          <a:p>
+            <a:endParaRPr lang="es-AR" dirty="0"/>
+          </a:p>
+          <a:p>
+            <a:r>
               <a:rPr lang="es-AR" dirty="0" smtClean="0"/>
               <a:t>Disponibilidad </a:t>
             </a:r>
@@ -10058,16 +10069,6 @@
           </a:p>
           <a:p>
             <a:endParaRPr lang="es-AR" dirty="0" smtClean="0"/>
-          </a:p>
-          <a:p>
-            <a:r>
-              <a:rPr lang="es-AR" dirty="0" smtClean="0"/>
-              <a:t>Acceso </a:t>
-            </a:r>
-            <a:r>
-              <a:rPr lang="es-AR" dirty="0"/>
-              <a:t>WEB</a:t>
-            </a:r>
           </a:p>
           <a:p>
             <a:endParaRPr lang="es-AR" dirty="0"/>
@@ -11385,11 +11386,7 @@
           <a:p>
             <a:r>
               <a:rPr lang="es-AR" dirty="0" smtClean="0"/>
-              <a:t>Metodologías </a:t>
-            </a:r>
-            <a:r>
-              <a:rPr lang="es-AR" dirty="0" smtClean="0"/>
-              <a:t>Ágiles</a:t>
+              <a:t>Metodologías Ágiles</a:t>
             </a:r>
             <a:endParaRPr lang="es-AR" dirty="0"/>
           </a:p>
@@ -13908,15 +13905,7 @@
           <a:p>
             <a:r>
               <a:rPr lang="es-AR" dirty="0" smtClean="0"/>
-              <a:t>Dar soporte a los </a:t>
-            </a:r>
-            <a:r>
-              <a:rPr lang="es-AR" dirty="0" smtClean="0"/>
-              <a:t>diferentes actores, </a:t>
-            </a:r>
-            <a:r>
-              <a:rPr lang="es-AR" dirty="0" smtClean="0"/>
-              <a:t>adecuando la información a su propia necesidad.</a:t>
+              <a:t>Dar soporte a los diferentes actores, adecuando la información a su propia necesidad.</a:t>
             </a:r>
             <a:endParaRPr lang="es-AR" dirty="0"/>
           </a:p>
@@ -14082,7 +14071,9 @@
           </a:xfrm>
         </p:spPr>
         <p:txBody>
-          <a:bodyPr/>
+          <a:bodyPr>
+            <a:normAutofit/>
+          </a:bodyPr>
           <a:lstStyle/>
           <a:p>
             <a:pPr marL="0" indent="0">
@@ -14099,7 +14090,7 @@
           <a:p>
             <a:r>
               <a:rPr lang="es-AR" dirty="0" smtClean="0"/>
-              <a:t>Comparación de Planificaciones sobre realizado.</a:t>
+              <a:t>Actividades Académicas e Institucionales</a:t>
             </a:r>
           </a:p>
           <a:p>
@@ -14108,25 +14099,43 @@
           <a:p>
             <a:r>
               <a:rPr lang="es-AR" dirty="0" smtClean="0"/>
-              <a:t>Tendencias </a:t>
-            </a:r>
-            <a:r>
-              <a:rPr lang="es-AR" dirty="0"/>
-              <a:t>en rendimiento de Alumnos.</a:t>
-            </a:r>
-          </a:p>
-          <a:p>
+              <a:t>Gestionar Planificación de clases y comparación con lo realmente ocurrido.</a:t>
+            </a:r>
             <a:endParaRPr lang="es-AR" dirty="0" smtClean="0"/>
           </a:p>
           <a:p>
+            <a:endParaRPr lang="es-AR" dirty="0" smtClean="0"/>
+          </a:p>
+          <a:p>
             <a:r>
               <a:rPr lang="es-AR" dirty="0" smtClean="0"/>
-              <a:t>Rendimientos </a:t>
-            </a:r>
-            <a:r>
-              <a:rPr lang="es-AR" dirty="0"/>
-              <a:t>de Cursos y Asignaturas.</a:t>
-            </a:r>
+              <a:t>Diversos medios de comunicación</a:t>
+            </a:r>
+          </a:p>
+          <a:p>
+            <a:pPr lvl="1"/>
+            <a:r>
+              <a:rPr lang="es-AR" dirty="0" smtClean="0"/>
+              <a:t>Mensajería Interna</a:t>
+            </a:r>
+          </a:p>
+          <a:p>
+            <a:pPr lvl="1"/>
+            <a:r>
+              <a:rPr lang="es-AR" dirty="0" smtClean="0"/>
+              <a:t>Foro</a:t>
+            </a:r>
+          </a:p>
+          <a:p>
+            <a:pPr lvl="1"/>
+            <a:r>
+              <a:rPr lang="es-AR" dirty="0" smtClean="0"/>
+              <a:t>Mensajes de Texto</a:t>
+            </a:r>
+            <a:endParaRPr lang="es-AR" dirty="0"/>
+          </a:p>
+          <a:p>
+            <a:endParaRPr lang="es-AR" dirty="0" smtClean="0"/>
           </a:p>
           <a:p>
             <a:endParaRPr lang="es-AR" dirty="0" smtClean="0"/>

</xml_diff>

<commit_message>
Lau - la presentación que presentamos
</commit_message>
<xml_diff>
--- a/Docs/01-Relevamiento Inicial/Presentacion/PrimeraExposicion - Resumida.pptx
+++ b/Docs/01-Relevamiento Inicial/Presentacion/PrimeraExposicion - Resumida.pptx
@@ -1635,891 +1635,6 @@
       <dsp:cNvGrpSpPr/>
     </dsp:nvGrpSpPr>
     <dsp:grpSpPr/>
-    <dsp:sp modelId="{D54B1729-BC98-42C1-9C6C-D65DCBA4358F}">
-      <dsp:nvSpPr>
-        <dsp:cNvPr id="0" name=""/>
-        <dsp:cNvSpPr/>
-      </dsp:nvSpPr>
-      <dsp:spPr>
-        <a:xfrm rot="5400000">
-          <a:off x="3221319" y="-2041440"/>
-          <a:ext cx="738852" cy="5010287"/>
-        </a:xfrm>
-        <a:prstGeom prst="rect">
-          <a:avLst/>
-        </a:prstGeom>
-        <a:solidFill>
-          <a:schemeClr val="accent3">
-            <a:tint val="40000"/>
-            <a:alpha val="90000"/>
-            <a:hueOff val="0"/>
-            <a:satOff val="0"/>
-            <a:lumOff val="0"/>
-            <a:alphaOff val="0"/>
-          </a:schemeClr>
-        </a:solidFill>
-        <a:ln w="9525" cap="flat" cmpd="sng" algn="ctr">
-          <a:solidFill>
-            <a:schemeClr val="accent3">
-              <a:tint val="40000"/>
-              <a:alpha val="90000"/>
-              <a:hueOff val="0"/>
-              <a:satOff val="0"/>
-              <a:lumOff val="0"/>
-              <a:alphaOff val="0"/>
-            </a:schemeClr>
-          </a:solidFill>
-          <a:prstDash val="solid"/>
-        </a:ln>
-        <a:effectLst>
-          <a:outerShdw blurRad="40000" dist="23000" dir="5400000" rotWithShape="0">
-            <a:srgbClr val="000000">
-              <a:alpha val="35000"/>
-            </a:srgbClr>
-          </a:outerShdw>
-        </a:effectLst>
-      </dsp:spPr>
-      <dsp:style>
-        <a:lnRef idx="1">
-          <a:scrgbClr r="0" g="0" b="0"/>
-        </a:lnRef>
-        <a:fillRef idx="1">
-          <a:scrgbClr r="0" g="0" b="0"/>
-        </a:fillRef>
-        <a:effectRef idx="2">
-          <a:scrgbClr r="0" g="0" b="0"/>
-        </a:effectRef>
-        <a:fontRef idx="minor"/>
-      </dsp:style>
-      <dsp:txBody>
-        <a:bodyPr spcFirstLastPara="0" vert="horz" wrap="square" lIns="247650" tIns="123825" rIns="247650" bIns="123825" numCol="1" spcCol="1270" anchor="ctr" anchorCtr="0">
-          <a:noAutofit/>
-        </a:bodyPr>
-        <a:lstStyle/>
-        <a:p>
-          <a:pPr marL="280988" lvl="1" indent="-280988" algn="l" defTabSz="1422400">
-            <a:lnSpc>
-              <a:spcPct val="90000"/>
-            </a:lnSpc>
-            <a:spcBef>
-              <a:spcPct val="0"/>
-            </a:spcBef>
-            <a:spcAft>
-              <a:spcPct val="15000"/>
-            </a:spcAft>
-            <a:buChar char="••"/>
-          </a:pPr>
-          <a:r>
-            <a:rPr lang="es-ES" sz="3200" kern="1200" dirty="0" smtClean="0">
-              <a:effectLst>
-                <a:outerShdw blurRad="38100" dist="38100" dir="2700000" algn="tl">
-                  <a:srgbClr val="000000">
-                    <a:alpha val="43137"/>
-                  </a:srgbClr>
-                </a:outerShdw>
-              </a:effectLst>
-            </a:rPr>
-            <a:t>Proceso de Preparación</a:t>
-          </a:r>
-          <a:endParaRPr lang="es-ES" sz="3200" kern="1200" dirty="0">
-            <a:effectLst>
-              <a:outerShdw blurRad="38100" dist="38100" dir="2700000" algn="tl">
-                <a:srgbClr val="000000">
-                  <a:alpha val="43137"/>
-                </a:srgbClr>
-              </a:outerShdw>
-            </a:effectLst>
-          </a:endParaRPr>
-        </a:p>
-      </dsp:txBody>
-      <dsp:txXfrm rot="-5400000">
-        <a:off x="1085602" y="94277"/>
-        <a:ext cx="5010287" cy="738852"/>
-      </dsp:txXfrm>
-    </dsp:sp>
-    <dsp:sp modelId="{7E429971-BC57-430F-BB25-C0574E5E39E3}">
-      <dsp:nvSpPr>
-        <dsp:cNvPr id="0" name=""/>
-        <dsp:cNvSpPr/>
-      </dsp:nvSpPr>
-      <dsp:spPr>
-        <a:xfrm>
-          <a:off x="109" y="0"/>
-          <a:ext cx="1085492" cy="923566"/>
-        </a:xfrm>
-        <a:prstGeom prst="roundRect">
-          <a:avLst/>
-        </a:prstGeom>
-        <a:gradFill rotWithShape="0">
-          <a:gsLst>
-            <a:gs pos="0">
-              <a:schemeClr val="accent3">
-                <a:hueOff val="0"/>
-                <a:satOff val="0"/>
-                <a:lumOff val="0"/>
-                <a:alphaOff val="0"/>
-                <a:shade val="51000"/>
-                <a:satMod val="130000"/>
-              </a:schemeClr>
-            </a:gs>
-            <a:gs pos="80000">
-              <a:schemeClr val="accent3">
-                <a:hueOff val="0"/>
-                <a:satOff val="0"/>
-                <a:lumOff val="0"/>
-                <a:alphaOff val="0"/>
-                <a:shade val="93000"/>
-                <a:satMod val="130000"/>
-              </a:schemeClr>
-            </a:gs>
-            <a:gs pos="100000">
-              <a:schemeClr val="accent3">
-                <a:hueOff val="0"/>
-                <a:satOff val="0"/>
-                <a:lumOff val="0"/>
-                <a:alphaOff val="0"/>
-                <a:shade val="94000"/>
-                <a:satMod val="135000"/>
-              </a:schemeClr>
-            </a:gs>
-          </a:gsLst>
-          <a:lin ang="16200000" scaled="0"/>
-        </a:gradFill>
-        <a:ln>
-          <a:noFill/>
-        </a:ln>
-        <a:effectLst>
-          <a:outerShdw blurRad="40000" dist="23000" dir="5400000" rotWithShape="0">
-            <a:srgbClr val="000000">
-              <a:alpha val="35000"/>
-            </a:srgbClr>
-          </a:outerShdw>
-        </a:effectLst>
-        <a:scene3d>
-          <a:camera prst="orthographicFront">
-            <a:rot lat="0" lon="0" rev="0"/>
-          </a:camera>
-          <a:lightRig rig="threePt" dir="t">
-            <a:rot lat="0" lon="0" rev="1200000"/>
-          </a:lightRig>
-        </a:scene3d>
-        <a:sp3d>
-          <a:bevelT w="63500" h="25400"/>
-        </a:sp3d>
-      </dsp:spPr>
-      <dsp:style>
-        <a:lnRef idx="0">
-          <a:scrgbClr r="0" g="0" b="0"/>
-        </a:lnRef>
-        <a:fillRef idx="3">
-          <a:scrgbClr r="0" g="0" b="0"/>
-        </a:fillRef>
-        <a:effectRef idx="3">
-          <a:scrgbClr r="0" g="0" b="0"/>
-        </a:effectRef>
-        <a:fontRef idx="minor">
-          <a:schemeClr val="lt1"/>
-        </a:fontRef>
-      </dsp:style>
-      <dsp:txBody>
-        <a:bodyPr spcFirstLastPara="0" vert="horz" wrap="square" lIns="167640" tIns="83820" rIns="167640" bIns="83820" numCol="1" spcCol="1270" anchor="ctr" anchorCtr="0">
-          <a:noAutofit/>
-        </a:bodyPr>
-        <a:lstStyle/>
-        <a:p>
-          <a:pPr lvl="0" algn="ctr" defTabSz="1955800">
-            <a:lnSpc>
-              <a:spcPct val="90000"/>
-            </a:lnSpc>
-            <a:spcBef>
-              <a:spcPct val="0"/>
-            </a:spcBef>
-            <a:spcAft>
-              <a:spcPct val="35000"/>
-            </a:spcAft>
-          </a:pPr>
-          <a:r>
-            <a:rPr lang="es-ES" sz="4400" kern="1200"/>
-            <a:t>1</a:t>
-          </a:r>
-        </a:p>
-      </dsp:txBody>
-      <dsp:txXfrm>
-        <a:off x="45194" y="45085"/>
-        <a:ext cx="995322" cy="833396"/>
-      </dsp:txXfrm>
-    </dsp:sp>
-    <dsp:sp modelId="{B37A5355-225B-4C6F-AED7-6C620F99EECC}">
-      <dsp:nvSpPr>
-        <dsp:cNvPr id="0" name=""/>
-        <dsp:cNvSpPr/>
-      </dsp:nvSpPr>
-      <dsp:spPr>
-        <a:xfrm rot="5400000">
-          <a:off x="3221319" y="-1071695"/>
-          <a:ext cx="738852" cy="5010287"/>
-        </a:xfrm>
-        <a:prstGeom prst="rect">
-          <a:avLst/>
-        </a:prstGeom>
-        <a:solidFill>
-          <a:schemeClr val="accent3">
-            <a:tint val="40000"/>
-            <a:alpha val="90000"/>
-            <a:hueOff val="3572285"/>
-            <a:satOff val="-4598"/>
-            <a:lumOff val="-358"/>
-            <a:alphaOff val="0"/>
-          </a:schemeClr>
-        </a:solidFill>
-        <a:ln w="9525" cap="flat" cmpd="sng" algn="ctr">
-          <a:solidFill>
-            <a:schemeClr val="accent3">
-              <a:tint val="40000"/>
-              <a:alpha val="90000"/>
-              <a:hueOff val="3572285"/>
-              <a:satOff val="-4598"/>
-              <a:lumOff val="-358"/>
-              <a:alphaOff val="0"/>
-            </a:schemeClr>
-          </a:solidFill>
-          <a:prstDash val="solid"/>
-        </a:ln>
-        <a:effectLst>
-          <a:outerShdw blurRad="40000" dist="23000" dir="5400000" rotWithShape="0">
-            <a:srgbClr val="000000">
-              <a:alpha val="35000"/>
-            </a:srgbClr>
-          </a:outerShdw>
-        </a:effectLst>
-      </dsp:spPr>
-      <dsp:style>
-        <a:lnRef idx="1">
-          <a:scrgbClr r="0" g="0" b="0"/>
-        </a:lnRef>
-        <a:fillRef idx="1">
-          <a:scrgbClr r="0" g="0" b="0"/>
-        </a:fillRef>
-        <a:effectRef idx="2">
-          <a:scrgbClr r="0" g="0" b="0"/>
-        </a:effectRef>
-        <a:fontRef idx="minor"/>
-      </dsp:style>
-      <dsp:txBody>
-        <a:bodyPr spcFirstLastPara="0" vert="horz" wrap="square" lIns="247650" tIns="123825" rIns="247650" bIns="123825" numCol="1" spcCol="1270" anchor="ctr" anchorCtr="0">
-          <a:noAutofit/>
-        </a:bodyPr>
-        <a:lstStyle/>
-        <a:p>
-          <a:pPr marL="285750" lvl="1" indent="-285750" algn="l" defTabSz="1422400">
-            <a:lnSpc>
-              <a:spcPct val="90000"/>
-            </a:lnSpc>
-            <a:spcBef>
-              <a:spcPct val="0"/>
-            </a:spcBef>
-            <a:spcAft>
-              <a:spcPct val="15000"/>
-            </a:spcAft>
-            <a:buChar char="••"/>
-          </a:pPr>
-          <a:r>
-            <a:rPr lang="es-ES" sz="3200" kern="1200" dirty="0" smtClean="0">
-              <a:effectLst>
-                <a:outerShdw blurRad="38100" dist="38100" dir="2700000" algn="tl">
-                  <a:srgbClr val="000000">
-                    <a:alpha val="43137"/>
-                  </a:srgbClr>
-                </a:outerShdw>
-              </a:effectLst>
-            </a:rPr>
-            <a:t>Proceso de </a:t>
-          </a:r>
-          <a:r>
-            <a:rPr lang="es-ES" sz="3200" kern="1200" dirty="0" err="1" smtClean="0">
-              <a:effectLst>
-                <a:outerShdw blurRad="38100" dist="38100" dir="2700000" algn="tl">
-                  <a:srgbClr val="000000">
-                    <a:alpha val="43137"/>
-                  </a:srgbClr>
-                </a:outerShdw>
-              </a:effectLst>
-            </a:rPr>
-            <a:t>Sprints</a:t>
-          </a:r>
-          <a:endParaRPr lang="es-ES" sz="3200" kern="1200" dirty="0">
-            <a:effectLst>
-              <a:outerShdw blurRad="38100" dist="38100" dir="2700000" algn="tl">
-                <a:srgbClr val="000000">
-                  <a:alpha val="43137"/>
-                </a:srgbClr>
-              </a:outerShdw>
-            </a:effectLst>
-          </a:endParaRPr>
-        </a:p>
-      </dsp:txBody>
-      <dsp:txXfrm rot="-5400000">
-        <a:off x="1085602" y="1064022"/>
-        <a:ext cx="5010287" cy="738852"/>
-      </dsp:txXfrm>
-    </dsp:sp>
-    <dsp:sp modelId="{C04276DC-EE64-470A-B8BC-09067B8045FA}">
-      <dsp:nvSpPr>
-        <dsp:cNvPr id="0" name=""/>
-        <dsp:cNvSpPr/>
-      </dsp:nvSpPr>
-      <dsp:spPr>
-        <a:xfrm>
-          <a:off x="109" y="971664"/>
-          <a:ext cx="1085492" cy="923566"/>
-        </a:xfrm>
-        <a:prstGeom prst="roundRect">
-          <a:avLst/>
-        </a:prstGeom>
-        <a:gradFill rotWithShape="0">
-          <a:gsLst>
-            <a:gs pos="0">
-              <a:schemeClr val="accent3">
-                <a:hueOff val="3750088"/>
-                <a:satOff val="-5627"/>
-                <a:lumOff val="-915"/>
-                <a:alphaOff val="0"/>
-                <a:shade val="51000"/>
-                <a:satMod val="130000"/>
-              </a:schemeClr>
-            </a:gs>
-            <a:gs pos="80000">
-              <a:schemeClr val="accent3">
-                <a:hueOff val="3750088"/>
-                <a:satOff val="-5627"/>
-                <a:lumOff val="-915"/>
-                <a:alphaOff val="0"/>
-                <a:shade val="93000"/>
-                <a:satMod val="130000"/>
-              </a:schemeClr>
-            </a:gs>
-            <a:gs pos="100000">
-              <a:schemeClr val="accent3">
-                <a:hueOff val="3750088"/>
-                <a:satOff val="-5627"/>
-                <a:lumOff val="-915"/>
-                <a:alphaOff val="0"/>
-                <a:shade val="94000"/>
-                <a:satMod val="135000"/>
-              </a:schemeClr>
-            </a:gs>
-          </a:gsLst>
-          <a:lin ang="16200000" scaled="0"/>
-        </a:gradFill>
-        <a:ln>
-          <a:noFill/>
-        </a:ln>
-        <a:effectLst>
-          <a:outerShdw blurRad="40000" dist="23000" dir="5400000" rotWithShape="0">
-            <a:srgbClr val="000000">
-              <a:alpha val="35000"/>
-            </a:srgbClr>
-          </a:outerShdw>
-        </a:effectLst>
-        <a:scene3d>
-          <a:camera prst="orthographicFront">
-            <a:rot lat="0" lon="0" rev="0"/>
-          </a:camera>
-          <a:lightRig rig="threePt" dir="t">
-            <a:rot lat="0" lon="0" rev="1200000"/>
-          </a:lightRig>
-        </a:scene3d>
-        <a:sp3d>
-          <a:bevelT w="63500" h="25400"/>
-        </a:sp3d>
-      </dsp:spPr>
-      <dsp:style>
-        <a:lnRef idx="0">
-          <a:scrgbClr r="0" g="0" b="0"/>
-        </a:lnRef>
-        <a:fillRef idx="3">
-          <a:scrgbClr r="0" g="0" b="0"/>
-        </a:fillRef>
-        <a:effectRef idx="3">
-          <a:scrgbClr r="0" g="0" b="0"/>
-        </a:effectRef>
-        <a:fontRef idx="minor">
-          <a:schemeClr val="lt1"/>
-        </a:fontRef>
-      </dsp:style>
-      <dsp:txBody>
-        <a:bodyPr spcFirstLastPara="0" vert="horz" wrap="square" lIns="167640" tIns="83820" rIns="167640" bIns="83820" numCol="1" spcCol="1270" anchor="ctr" anchorCtr="0">
-          <a:noAutofit/>
-        </a:bodyPr>
-        <a:lstStyle/>
-        <a:p>
-          <a:pPr lvl="0" algn="ctr" defTabSz="1955800">
-            <a:lnSpc>
-              <a:spcPct val="90000"/>
-            </a:lnSpc>
-            <a:spcBef>
-              <a:spcPct val="0"/>
-            </a:spcBef>
-            <a:spcAft>
-              <a:spcPct val="35000"/>
-            </a:spcAft>
-          </a:pPr>
-          <a:r>
-            <a:rPr lang="es-ES" sz="4400" kern="1200"/>
-            <a:t>2</a:t>
-          </a:r>
-        </a:p>
-      </dsp:txBody>
-      <dsp:txXfrm>
-        <a:off x="45194" y="1016749"/>
-        <a:ext cx="995322" cy="833396"/>
-      </dsp:txXfrm>
-    </dsp:sp>
-    <dsp:sp modelId="{C7C3E6FD-D83F-4BDA-907E-B5EE041DA931}">
-      <dsp:nvSpPr>
-        <dsp:cNvPr id="0" name=""/>
-        <dsp:cNvSpPr/>
-      </dsp:nvSpPr>
-      <dsp:spPr>
-        <a:xfrm rot="5400000">
-          <a:off x="3221319" y="-101951"/>
-          <a:ext cx="738852" cy="5010287"/>
-        </a:xfrm>
-        <a:prstGeom prst="rect">
-          <a:avLst/>
-        </a:prstGeom>
-        <a:solidFill>
-          <a:schemeClr val="accent3">
-            <a:tint val="40000"/>
-            <a:alpha val="90000"/>
-            <a:hueOff val="7144569"/>
-            <a:satOff val="-9195"/>
-            <a:lumOff val="-717"/>
-            <a:alphaOff val="0"/>
-          </a:schemeClr>
-        </a:solidFill>
-        <a:ln w="9525" cap="flat" cmpd="sng" algn="ctr">
-          <a:solidFill>
-            <a:schemeClr val="accent3">
-              <a:tint val="40000"/>
-              <a:alpha val="90000"/>
-              <a:hueOff val="7144569"/>
-              <a:satOff val="-9195"/>
-              <a:lumOff val="-717"/>
-              <a:alphaOff val="0"/>
-            </a:schemeClr>
-          </a:solidFill>
-          <a:prstDash val="solid"/>
-        </a:ln>
-        <a:effectLst>
-          <a:outerShdw blurRad="40000" dist="23000" dir="5400000" rotWithShape="0">
-            <a:srgbClr val="000000">
-              <a:alpha val="35000"/>
-            </a:srgbClr>
-          </a:outerShdw>
-        </a:effectLst>
-      </dsp:spPr>
-      <dsp:style>
-        <a:lnRef idx="1">
-          <a:scrgbClr r="0" g="0" b="0"/>
-        </a:lnRef>
-        <a:fillRef idx="1">
-          <a:scrgbClr r="0" g="0" b="0"/>
-        </a:fillRef>
-        <a:effectRef idx="2">
-          <a:scrgbClr r="0" g="0" b="0"/>
-        </a:effectRef>
-        <a:fontRef idx="minor"/>
-      </dsp:style>
-      <dsp:txBody>
-        <a:bodyPr spcFirstLastPara="0" vert="horz" wrap="square" lIns="247650" tIns="123825" rIns="247650" bIns="123825" numCol="1" spcCol="1270" anchor="ctr" anchorCtr="0">
-          <a:noAutofit/>
-        </a:bodyPr>
-        <a:lstStyle/>
-        <a:p>
-          <a:pPr marL="285750" lvl="1" indent="-285750" algn="l" defTabSz="1422400">
-            <a:lnSpc>
-              <a:spcPct val="90000"/>
-            </a:lnSpc>
-            <a:spcBef>
-              <a:spcPct val="0"/>
-            </a:spcBef>
-            <a:spcAft>
-              <a:spcPct val="15000"/>
-            </a:spcAft>
-            <a:buChar char="••"/>
-          </a:pPr>
-          <a:r>
-            <a:rPr lang="es-ES" sz="3200" kern="1200" dirty="0" smtClean="0">
-              <a:effectLst>
-                <a:outerShdw blurRad="38100" dist="38100" dir="2700000" algn="tl">
-                  <a:srgbClr val="000000">
-                    <a:alpha val="43137"/>
-                  </a:srgbClr>
-                </a:outerShdw>
-              </a:effectLst>
-            </a:rPr>
-            <a:t>Proceso Diario de trabajo</a:t>
-          </a:r>
-          <a:endParaRPr lang="es-ES" sz="3200" kern="1200" dirty="0">
-            <a:effectLst>
-              <a:outerShdw blurRad="38100" dist="38100" dir="2700000" algn="tl">
-                <a:srgbClr val="000000">
-                  <a:alpha val="43137"/>
-                </a:srgbClr>
-              </a:outerShdw>
-            </a:effectLst>
-          </a:endParaRPr>
-        </a:p>
-      </dsp:txBody>
-      <dsp:txXfrm rot="-5400000">
-        <a:off x="1085602" y="2033766"/>
-        <a:ext cx="5010287" cy="738852"/>
-      </dsp:txXfrm>
-    </dsp:sp>
-    <dsp:sp modelId="{F5034101-5B7D-4FE7-B47A-5A48CF39606B}">
-      <dsp:nvSpPr>
-        <dsp:cNvPr id="0" name=""/>
-        <dsp:cNvSpPr/>
-      </dsp:nvSpPr>
-      <dsp:spPr>
-        <a:xfrm>
-          <a:off x="109" y="1941409"/>
-          <a:ext cx="1085492" cy="923566"/>
-        </a:xfrm>
-        <a:prstGeom prst="roundRect">
-          <a:avLst/>
-        </a:prstGeom>
-        <a:gradFill rotWithShape="0">
-          <a:gsLst>
-            <a:gs pos="0">
-              <a:schemeClr val="accent3">
-                <a:hueOff val="7500176"/>
-                <a:satOff val="-11253"/>
-                <a:lumOff val="-1830"/>
-                <a:alphaOff val="0"/>
-                <a:shade val="51000"/>
-                <a:satMod val="130000"/>
-              </a:schemeClr>
-            </a:gs>
-            <a:gs pos="80000">
-              <a:schemeClr val="accent3">
-                <a:hueOff val="7500176"/>
-                <a:satOff val="-11253"/>
-                <a:lumOff val="-1830"/>
-                <a:alphaOff val="0"/>
-                <a:shade val="93000"/>
-                <a:satMod val="130000"/>
-              </a:schemeClr>
-            </a:gs>
-            <a:gs pos="100000">
-              <a:schemeClr val="accent3">
-                <a:hueOff val="7500176"/>
-                <a:satOff val="-11253"/>
-                <a:lumOff val="-1830"/>
-                <a:alphaOff val="0"/>
-                <a:shade val="94000"/>
-                <a:satMod val="135000"/>
-              </a:schemeClr>
-            </a:gs>
-          </a:gsLst>
-          <a:lin ang="16200000" scaled="0"/>
-        </a:gradFill>
-        <a:ln>
-          <a:noFill/>
-        </a:ln>
-        <a:effectLst>
-          <a:outerShdw blurRad="40000" dist="23000" dir="5400000" rotWithShape="0">
-            <a:srgbClr val="000000">
-              <a:alpha val="35000"/>
-            </a:srgbClr>
-          </a:outerShdw>
-        </a:effectLst>
-        <a:scene3d>
-          <a:camera prst="orthographicFront">
-            <a:rot lat="0" lon="0" rev="0"/>
-          </a:camera>
-          <a:lightRig rig="threePt" dir="t">
-            <a:rot lat="0" lon="0" rev="1200000"/>
-          </a:lightRig>
-        </a:scene3d>
-        <a:sp3d>
-          <a:bevelT w="63500" h="25400"/>
-        </a:sp3d>
-      </dsp:spPr>
-      <dsp:style>
-        <a:lnRef idx="0">
-          <a:scrgbClr r="0" g="0" b="0"/>
-        </a:lnRef>
-        <a:fillRef idx="3">
-          <a:scrgbClr r="0" g="0" b="0"/>
-        </a:fillRef>
-        <a:effectRef idx="3">
-          <a:scrgbClr r="0" g="0" b="0"/>
-        </a:effectRef>
-        <a:fontRef idx="minor">
-          <a:schemeClr val="lt1"/>
-        </a:fontRef>
-      </dsp:style>
-      <dsp:txBody>
-        <a:bodyPr spcFirstLastPara="0" vert="horz" wrap="square" lIns="167640" tIns="83820" rIns="167640" bIns="83820" numCol="1" spcCol="1270" anchor="ctr" anchorCtr="0">
-          <a:noAutofit/>
-        </a:bodyPr>
-        <a:lstStyle/>
-        <a:p>
-          <a:pPr lvl="0" algn="ctr" defTabSz="1955800">
-            <a:lnSpc>
-              <a:spcPct val="90000"/>
-            </a:lnSpc>
-            <a:spcBef>
-              <a:spcPct val="0"/>
-            </a:spcBef>
-            <a:spcAft>
-              <a:spcPct val="35000"/>
-            </a:spcAft>
-          </a:pPr>
-          <a:r>
-            <a:rPr lang="es-ES" sz="4400" kern="1200" dirty="0"/>
-            <a:t>3</a:t>
-          </a:r>
-        </a:p>
-      </dsp:txBody>
-      <dsp:txXfrm>
-        <a:off x="45194" y="1986494"/>
-        <a:ext cx="995322" cy="833396"/>
-      </dsp:txXfrm>
-    </dsp:sp>
-    <dsp:sp modelId="{270C623C-A64F-49BF-B7A6-B42479FC6076}">
-      <dsp:nvSpPr>
-        <dsp:cNvPr id="0" name=""/>
-        <dsp:cNvSpPr/>
-      </dsp:nvSpPr>
-      <dsp:spPr>
-        <a:xfrm rot="5400000">
-          <a:off x="3217075" y="863438"/>
-          <a:ext cx="738852" cy="5018996"/>
-        </a:xfrm>
-        <a:prstGeom prst="round2SameRect">
-          <a:avLst/>
-        </a:prstGeom>
-        <a:solidFill>
-          <a:schemeClr val="accent3">
-            <a:tint val="40000"/>
-            <a:alpha val="90000"/>
-            <a:hueOff val="10716854"/>
-            <a:satOff val="-13793"/>
-            <a:lumOff val="-1075"/>
-            <a:alphaOff val="0"/>
-          </a:schemeClr>
-        </a:solidFill>
-        <a:ln w="9525" cap="flat" cmpd="sng" algn="ctr">
-          <a:solidFill>
-            <a:schemeClr val="accent3">
-              <a:tint val="40000"/>
-              <a:alpha val="90000"/>
-              <a:hueOff val="10716854"/>
-              <a:satOff val="-13793"/>
-              <a:lumOff val="-1075"/>
-              <a:alphaOff val="0"/>
-            </a:schemeClr>
-          </a:solidFill>
-          <a:prstDash val="solid"/>
-        </a:ln>
-        <a:effectLst>
-          <a:outerShdw blurRad="40000" dist="23000" dir="5400000" rotWithShape="0">
-            <a:srgbClr val="000000">
-              <a:alpha val="35000"/>
-            </a:srgbClr>
-          </a:outerShdw>
-        </a:effectLst>
-      </dsp:spPr>
-      <dsp:style>
-        <a:lnRef idx="1">
-          <a:scrgbClr r="0" g="0" b="0"/>
-        </a:lnRef>
-        <a:fillRef idx="1">
-          <a:scrgbClr r="0" g="0" b="0"/>
-        </a:fillRef>
-        <a:effectRef idx="2">
-          <a:scrgbClr r="0" g="0" b="0"/>
-        </a:effectRef>
-        <a:fontRef idx="minor"/>
-      </dsp:style>
-      <dsp:txBody>
-        <a:bodyPr spcFirstLastPara="0" vert="horz" wrap="square" lIns="247650" tIns="123825" rIns="247650" bIns="123825" numCol="1" spcCol="1270" anchor="ctr" anchorCtr="0">
-          <a:noAutofit/>
-        </a:bodyPr>
-        <a:lstStyle/>
-        <a:p>
-          <a:pPr marL="285750" lvl="1" indent="-285750" algn="l" defTabSz="1422400">
-            <a:lnSpc>
-              <a:spcPct val="90000"/>
-            </a:lnSpc>
-            <a:spcBef>
-              <a:spcPct val="0"/>
-            </a:spcBef>
-            <a:spcAft>
-              <a:spcPct val="15000"/>
-            </a:spcAft>
-            <a:buChar char="••"/>
-          </a:pPr>
-          <a:r>
-            <a:rPr lang="es-AR" sz="3200" kern="1200" dirty="0" smtClean="0">
-              <a:effectLst>
-                <a:outerShdw blurRad="38100" dist="38100" dir="2700000" algn="tl">
-                  <a:srgbClr val="000000">
-                    <a:alpha val="43137"/>
-                  </a:srgbClr>
-                </a:outerShdw>
-              </a:effectLst>
-            </a:rPr>
-            <a:t>Proceso de Diseño</a:t>
-          </a:r>
-          <a:endParaRPr lang="es-ES" sz="3200" kern="1200" dirty="0">
-            <a:effectLst>
-              <a:outerShdw blurRad="38100" dist="38100" dir="2700000" algn="tl">
-                <a:srgbClr val="000000">
-                  <a:alpha val="43137"/>
-                </a:srgbClr>
-              </a:outerShdw>
-            </a:effectLst>
-          </a:endParaRPr>
-        </a:p>
-      </dsp:txBody>
-      <dsp:txXfrm rot="-5400000">
-        <a:off x="1077003" y="3039578"/>
-        <a:ext cx="4982928" cy="666716"/>
-      </dsp:txXfrm>
-    </dsp:sp>
-    <dsp:sp modelId="{5E1D7B8E-386A-447F-9EE2-4081F97198A5}">
-      <dsp:nvSpPr>
-        <dsp:cNvPr id="0" name=""/>
-        <dsp:cNvSpPr/>
-      </dsp:nvSpPr>
-      <dsp:spPr>
-        <a:xfrm>
-          <a:off x="109" y="2911153"/>
-          <a:ext cx="1076175" cy="923566"/>
-        </a:xfrm>
-        <a:prstGeom prst="roundRect">
-          <a:avLst/>
-        </a:prstGeom>
-        <a:gradFill rotWithShape="0">
-          <a:gsLst>
-            <a:gs pos="0">
-              <a:schemeClr val="accent3">
-                <a:hueOff val="11250264"/>
-                <a:satOff val="-16880"/>
-                <a:lumOff val="-2745"/>
-                <a:alphaOff val="0"/>
-                <a:shade val="51000"/>
-                <a:satMod val="130000"/>
-              </a:schemeClr>
-            </a:gs>
-            <a:gs pos="80000">
-              <a:schemeClr val="accent3">
-                <a:hueOff val="11250264"/>
-                <a:satOff val="-16880"/>
-                <a:lumOff val="-2745"/>
-                <a:alphaOff val="0"/>
-                <a:shade val="93000"/>
-                <a:satMod val="130000"/>
-              </a:schemeClr>
-            </a:gs>
-            <a:gs pos="100000">
-              <a:schemeClr val="accent3">
-                <a:hueOff val="11250264"/>
-                <a:satOff val="-16880"/>
-                <a:lumOff val="-2745"/>
-                <a:alphaOff val="0"/>
-                <a:shade val="94000"/>
-                <a:satMod val="135000"/>
-              </a:schemeClr>
-            </a:gs>
-          </a:gsLst>
-          <a:lin ang="16200000" scaled="0"/>
-        </a:gradFill>
-        <a:ln>
-          <a:noFill/>
-        </a:ln>
-        <a:effectLst>
-          <a:outerShdw blurRad="40000" dist="23000" dir="5400000" rotWithShape="0">
-            <a:srgbClr val="000000">
-              <a:alpha val="35000"/>
-            </a:srgbClr>
-          </a:outerShdw>
-        </a:effectLst>
-        <a:scene3d>
-          <a:camera prst="orthographicFront">
-            <a:rot lat="0" lon="0" rev="0"/>
-          </a:camera>
-          <a:lightRig rig="threePt" dir="t">
-            <a:rot lat="0" lon="0" rev="1200000"/>
-          </a:lightRig>
-        </a:scene3d>
-        <a:sp3d>
-          <a:bevelT w="63500" h="25400"/>
-        </a:sp3d>
-      </dsp:spPr>
-      <dsp:style>
-        <a:lnRef idx="0">
-          <a:scrgbClr r="0" g="0" b="0"/>
-        </a:lnRef>
-        <a:fillRef idx="3">
-          <a:scrgbClr r="0" g="0" b="0"/>
-        </a:fillRef>
-        <a:effectRef idx="3">
-          <a:scrgbClr r="0" g="0" b="0"/>
-        </a:effectRef>
-        <a:fontRef idx="minor">
-          <a:schemeClr val="lt1"/>
-        </a:fontRef>
-      </dsp:style>
-      <dsp:txBody>
-        <a:bodyPr spcFirstLastPara="0" vert="horz" wrap="square" lIns="121920" tIns="60960" rIns="121920" bIns="60960" numCol="1" spcCol="1270" anchor="ctr" anchorCtr="0">
-          <a:noAutofit/>
-        </a:bodyPr>
-        <a:lstStyle/>
-        <a:p>
-          <a:pPr lvl="0" algn="ctr" defTabSz="1422400">
-            <a:lnSpc>
-              <a:spcPct val="90000"/>
-            </a:lnSpc>
-            <a:spcBef>
-              <a:spcPct val="0"/>
-            </a:spcBef>
-            <a:spcAft>
-              <a:spcPct val="35000"/>
-            </a:spcAft>
-          </a:pPr>
-          <a:r>
-            <a:rPr lang="es-ES" sz="3200" kern="1200" dirty="0" smtClean="0">
-              <a:effectLst>
-                <a:outerShdw blurRad="38100" dist="38100" dir="2700000" algn="tl">
-                  <a:srgbClr val="000000">
-                    <a:alpha val="43137"/>
-                  </a:srgbClr>
-                </a:outerShdw>
-              </a:effectLst>
-            </a:rPr>
-            <a:t>4</a:t>
-          </a:r>
-          <a:endParaRPr lang="es-ES" sz="3200" kern="1200" dirty="0">
-            <a:effectLst>
-              <a:outerShdw blurRad="38100" dist="38100" dir="2700000" algn="tl">
-                <a:srgbClr val="000000">
-                  <a:alpha val="43137"/>
-                </a:srgbClr>
-              </a:outerShdw>
-            </a:effectLst>
-          </a:endParaRPr>
-        </a:p>
-      </dsp:txBody>
-      <dsp:txXfrm>
-        <a:off x="45194" y="2956238"/>
-        <a:ext cx="986005" cy="833396"/>
-      </dsp:txXfrm>
-    </dsp:sp>
   </dsp:spTree>
 </dsp:drawing>
 </file>
@@ -3874,7 +2989,7 @@
             <a:fld id="{D83FDC75-7F73-4A4A-A77C-09AADF00E0EA}" type="datetimeFigureOut">
               <a:rPr lang="es-ES" smtClean="0"/>
               <a:pPr/>
-              <a:t>09/05/2011</a:t>
+              <a:t>10/05/2011</a:t>
             </a:fld>
             <a:endParaRPr lang="es-ES" dirty="0"/>
           </a:p>
@@ -10678,7 +9793,7 @@
         </p:blipFill>
         <p:spPr>
           <a:xfrm>
-            <a:off x="5499309" y="1336632"/>
+            <a:off x="5865346" y="1484784"/>
             <a:ext cx="1600423" cy="1409897"/>
           </a:xfrm>
           <a:prstGeom prst="rect">
@@ -10708,7 +9823,7 @@
         </p:blipFill>
         <p:spPr>
           <a:xfrm>
-            <a:off x="7238554" y="1069702"/>
+            <a:off x="7465769" y="722183"/>
             <a:ext cx="1501313" cy="1228897"/>
           </a:xfrm>
           <a:prstGeom prst="rect">
@@ -10738,7 +9853,7 @@
         </p:blipFill>
         <p:spPr>
           <a:xfrm>
-            <a:off x="6982939" y="3284984"/>
+            <a:off x="7456492" y="3284984"/>
             <a:ext cx="1233487" cy="923925"/>
           </a:xfrm>
           <a:prstGeom prst="rect">
@@ -10748,14 +9863,14 @@
       </p:pic>
       <p:pic>
         <p:nvPicPr>
-          <p:cNvPr id="8" name="7 Imagen"/>
+          <p:cNvPr id="4" name="3 Imagen"/>
           <p:cNvPicPr>
             <a:picLocks noChangeAspect="1"/>
           </p:cNvPicPr>
           <p:nvPr/>
         </p:nvPicPr>
         <p:blipFill>
-          <a:blip r:embed="rId6">
+          <a:blip r:embed="rId6" cstate="email">
             <a:extLst>
               <a:ext uri="{28A0092B-C50C-407E-A947-70E740481C1C}">
                 <a14:useLocalDpi xmlns:a14="http://schemas.microsoft.com/office/drawing/2010/main" val="0"/>
@@ -10768,8 +9883,8 @@
         </p:blipFill>
         <p:spPr>
           <a:xfrm>
-            <a:off x="6299521" y="2460779"/>
-            <a:ext cx="2600325" cy="571500"/>
+            <a:off x="6982939" y="1988926"/>
+            <a:ext cx="1946235" cy="1178969"/>
           </a:xfrm>
           <a:prstGeom prst="rect">
             <a:avLst/>
@@ -11686,11 +10801,7 @@
           <a:p>
             <a:r>
               <a:rPr lang="es-AR" dirty="0" smtClean="0"/>
-              <a:t>Marco </a:t>
-            </a:r>
-            <a:r>
-              <a:rPr lang="es-AR" dirty="0" smtClean="0"/>
-              <a:t>de Trabajo: </a:t>
+              <a:t>Marco de Trabajo: </a:t>
             </a:r>
             <a:r>
               <a:rPr lang="es-AR" sz="3600" b="1" dirty="0" err="1" smtClean="0"/>
@@ -14090,7 +13201,6 @@
               <a:rPr lang="es-AR" dirty="0" smtClean="0"/>
               <a:t>Gestionar Planificación de clases y comparación con lo realmente ocurrido.</a:t>
             </a:r>
-            <a:endParaRPr lang="es-AR" dirty="0" smtClean="0"/>
           </a:p>
           <a:p>
             <a:endParaRPr lang="es-AR" dirty="0" smtClean="0"/>

</xml_diff>